<commit_message>
- Add dataset for "Sprinkler" and "Alarm" network. - Add the result of learning networks to PPT
</commit_message>
<xml_diff>
--- a/papers/BayesianNetwork160306.pptx
+++ b/papers/BayesianNetwork160306.pptx
@@ -5,7 +5,7 @@
     <p:sldMasterId id="2147483648" r:id="rId1"/>
   </p:sldMasterIdLst>
   <p:notesMasterIdLst>
-    <p:notesMasterId r:id="rId21"/>
+    <p:notesMasterId r:id="rId25"/>
   </p:notesMasterIdLst>
   <p:sldIdLst>
     <p:sldId id="270" r:id="rId2"/>
@@ -23,10 +23,14 @@
     <p:sldId id="282" r:id="rId14"/>
     <p:sldId id="284" r:id="rId15"/>
     <p:sldId id="288" r:id="rId16"/>
-    <p:sldId id="285" r:id="rId17"/>
-    <p:sldId id="286" r:id="rId18"/>
+    <p:sldId id="292" r:id="rId17"/>
+    <p:sldId id="291" r:id="rId18"/>
     <p:sldId id="287" r:id="rId19"/>
-    <p:sldId id="283" r:id="rId20"/>
+    <p:sldId id="293" r:id="rId20"/>
+    <p:sldId id="294" r:id="rId21"/>
+    <p:sldId id="295" r:id="rId22"/>
+    <p:sldId id="296" r:id="rId23"/>
+    <p:sldId id="283" r:id="rId24"/>
   </p:sldIdLst>
   <p:sldSz cx="9144000" cy="6858000" type="screen4x3"/>
   <p:notesSz cx="6858000" cy="9144000"/>
@@ -157,7 +161,7 @@
   </p:defaultTextStyle>
   <p:extLst>
     <p:ext uri="{EFAFB233-063F-42B5-8137-9DF3F51BA10A}">
-      <p15:sldGuideLst xmlns="" xmlns:p15="http://schemas.microsoft.com/office/powerpoint/2012/main">
+      <p15:sldGuideLst xmlns:p15="http://schemas.microsoft.com/office/powerpoint/2012/main">
         <p15:guide id="1" orient="horz" pos="1680">
           <p15:clr>
             <a:srgbClr val="A4A3A4"/>
@@ -6007,32 +6011,36 @@
           <a:lstStyle/>
           <a:p>
             <a:r>
+              <a:rPr lang="en-US" altLang="ko-KR" dirty="0" smtClean="0"/>
+              <a:t>Bayesian Network</a:t>
+            </a:r>
+            <a:r>
               <a:rPr lang="ko-KR" altLang="en-US" dirty="0" smtClean="0"/>
-              <a:t>대표적인 </a:t>
-            </a:r>
-            <a:r>
-              <a:rPr lang="en-US" altLang="ko-KR" dirty="0" smtClean="0"/>
-              <a:t>Benchmark Network</a:t>
+              <a:t>의 여러 </a:t>
+            </a:r>
+            <a:r>
+              <a:rPr lang="en-US" altLang="ko-KR" dirty="0" smtClean="0"/>
+              <a:t>Problem</a:t>
             </a:r>
             <a:r>
               <a:rPr lang="ko-KR" altLang="en-US" dirty="0" smtClean="0"/>
-              <a:t>인 </a:t>
-            </a:r>
-            <a:r>
-              <a:rPr lang="en-US" altLang="ko-KR" dirty="0" smtClean="0"/>
-              <a:t>Asia Network</a:t>
+              <a:t> 중 </a:t>
+            </a:r>
+            <a:r>
+              <a:rPr lang="en-US" altLang="ko-KR" dirty="0" smtClean="0"/>
+              <a:t>Sprinkler, Asia, Alarm</a:t>
             </a:r>
             <a:r>
               <a:rPr lang="ko-KR" altLang="en-US" dirty="0" smtClean="0"/>
-              <a:t>를 </a:t>
-            </a:r>
-            <a:r>
-              <a:rPr lang="en-US" altLang="ko-KR" dirty="0" smtClean="0"/>
-              <a:t>K2</a:t>
+              <a:t> </a:t>
+            </a:r>
+            <a:r>
+              <a:rPr lang="en-US" altLang="ko-KR" dirty="0" smtClean="0"/>
+              <a:t>network</a:t>
             </a:r>
             <a:r>
               <a:rPr lang="ko-KR" altLang="en-US" dirty="0" smtClean="0"/>
-              <a:t>알고리즘을 이용해 학습</a:t>
+              <a:t> 등 실험</a:t>
             </a:r>
             <a:endParaRPr lang="en-US" altLang="ko-KR" dirty="0" smtClean="0"/>
           </a:p>
@@ -6055,7 +6063,43 @@
             </a:r>
             <a:r>
               <a:rPr lang="ko-KR" altLang="en-US" dirty="0" smtClean="0"/>
-              <a:t>증가시켜 가며 확인</a:t>
+              <a:t>증가시켜 가며 </a:t>
+            </a:r>
+            <a:r>
+              <a:rPr lang="ko-KR" altLang="en-US" dirty="0" smtClean="0"/>
+              <a:t>확인</a:t>
+            </a:r>
+            <a:endParaRPr lang="en-US" altLang="ko-KR" dirty="0" smtClean="0"/>
+          </a:p>
+          <a:p>
+            <a:r>
+              <a:rPr lang="en-US" altLang="ko-KR" dirty="0" smtClean="0"/>
+              <a:t>Machine Learning Library</a:t>
+            </a:r>
+            <a:r>
+              <a:rPr lang="ko-KR" altLang="en-US" dirty="0" smtClean="0"/>
+              <a:t> 중 </a:t>
+            </a:r>
+            <a:r>
+              <a:rPr lang="en-US" altLang="ko-KR" dirty="0" smtClean="0"/>
+              <a:t>WEKA</a:t>
+            </a:r>
+            <a:r>
+              <a:rPr lang="ko-KR" altLang="en-US" dirty="0" smtClean="0"/>
+              <a:t>를 사용</a:t>
+            </a:r>
+            <a:endParaRPr lang="en-US" altLang="ko-KR" dirty="0" smtClean="0"/>
+          </a:p>
+          <a:p>
+            <a:r>
+              <a:rPr lang="en-US" altLang="ko-KR" dirty="0" smtClean="0"/>
+              <a:t>Score Metric : Bayes</a:t>
+            </a:r>
+          </a:p>
+          <a:p>
+            <a:r>
+              <a:rPr lang="en-US" altLang="ko-KR" dirty="0" smtClean="0"/>
+              <a:t>K-fold cross validation(K=10)</a:t>
             </a:r>
             <a:endParaRPr lang="en-US" altLang="ko-KR" dirty="0" smtClean="0"/>
           </a:p>
@@ -6133,25 +6177,83 @@
           <a:bodyPr/>
           <a:lstStyle/>
           <a:p>
+            <a:pPr marL="457200" marR="0" lvl="0" indent="-457200" defTabSz="914400" eaLnBrk="1" fontAlgn="auto" latinLnBrk="0" hangingPunct="1">
+              <a:lnSpc>
+                <a:spcPct val="100000"/>
+              </a:lnSpc>
+              <a:spcBef>
+                <a:spcPts val="0"/>
+              </a:spcBef>
+              <a:spcAft>
+                <a:spcPts val="0"/>
+              </a:spcAft>
+              <a:buClrTx/>
+              <a:buSzTx/>
+              <a:buFontTx/>
+              <a:buAutoNum type="arabicParenR"/>
+              <a:tabLst/>
+              <a:defRPr/>
+            </a:pPr>
+            <a:r>
+              <a:rPr lang="en-US" altLang="ko-KR" dirty="0" smtClean="0"/>
+              <a:t>Sprinkler Network</a:t>
+            </a:r>
+          </a:p>
+          <a:p>
+            <a:pPr lvl="1" eaLnBrk="1" fontAlgn="auto" hangingPunct="1">
+              <a:spcBef>
+                <a:spcPts val="0"/>
+              </a:spcBef>
+              <a:spcAft>
+                <a:spcPts val="0"/>
+              </a:spcAft>
+              <a:buClrTx/>
+              <a:buFont typeface="Arial" charset="0"/>
+              <a:buChar char="•"/>
+            </a:pPr>
             <a:r>
               <a:rPr lang="ko-KR" altLang="en-US" dirty="0" smtClean="0"/>
-              <a:t>알려진 </a:t>
-            </a:r>
-            <a:r>
-              <a:rPr lang="en-US" altLang="ko-KR" dirty="0" smtClean="0"/>
-              <a:t>Asia network</a:t>
-            </a:r>
+              <a:t>노드의 수</a:t>
+            </a:r>
+            <a:r>
+              <a:rPr lang="en-US" altLang="ko-KR" dirty="0" smtClean="0"/>
+              <a:t> : 4</a:t>
+            </a:r>
+          </a:p>
+          <a:p>
+            <a:pPr lvl="1" eaLnBrk="1" fontAlgn="auto" hangingPunct="1">
+              <a:spcBef>
+                <a:spcPts val="0"/>
+              </a:spcBef>
+              <a:spcAft>
+                <a:spcPts val="0"/>
+              </a:spcAft>
+              <a:buClrTx/>
+              <a:buFont typeface="Arial" charset="0"/>
+              <a:buChar char="•"/>
+            </a:pPr>
             <a:r>
               <a:rPr lang="ko-KR" altLang="en-US" dirty="0" smtClean="0"/>
-              <a:t>의 구조</a:t>
-            </a:r>
-            <a:endParaRPr lang="ko-KR" altLang="en-US" dirty="0"/>
+              <a:t>간선의 수 </a:t>
+            </a:r>
+            <a:r>
+              <a:rPr lang="en-US" altLang="ko-KR" dirty="0" smtClean="0"/>
+              <a:t>:</a:t>
+            </a:r>
+            <a:r>
+              <a:rPr lang="ko-KR" altLang="en-US" dirty="0" smtClean="0"/>
+              <a:t> </a:t>
+            </a:r>
+            <a:r>
+              <a:rPr lang="en-US" altLang="ko-KR" dirty="0" smtClean="0"/>
+              <a:t>4</a:t>
+            </a:r>
           </a:p>
         </p:txBody>
       </p:sp>
       <p:pic>
         <p:nvPicPr>
-          <p:cNvPr id="4" name="그림 3"/>
+          <p:cNvPr id="5" name="그림 4"/>
           <p:cNvPicPr>
             <a:picLocks noChangeAspect="1"/>
           </p:cNvPicPr>
@@ -6171,15 +6273,12 @@
         </p:blipFill>
         <p:spPr>
           <a:xfrm>
-            <a:off x="2644544" y="2590342"/>
-            <a:ext cx="5265741" cy="4058644"/>
+            <a:off x="4409162" y="2592147"/>
+            <a:ext cx="4328786" cy="3313702"/>
           </a:xfrm>
           <a:prstGeom prst="rect">
             <a:avLst/>
           </a:prstGeom>
-          <a:effectLst>
-            <a:softEdge rad="63500"/>
-          </a:effectLst>
         </p:spPr>
       </p:pic>
     </p:spTree>
@@ -6255,789 +6354,85 @@
           <a:lstStyle/>
           <a:p>
             <a:r>
-              <a:rPr lang="en-US" altLang="ko-KR" dirty="0" smtClean="0"/>
-              <a:t>Data size = 500</a:t>
-            </a:r>
+              <a:rPr lang="ko-KR" altLang="en-US" dirty="0" smtClean="0"/>
+              <a:t>결과</a:t>
+            </a:r>
+            <a:endParaRPr lang="en-US" altLang="ko-KR" dirty="0" smtClean="0"/>
+          </a:p>
+          <a:p>
+            <a:pPr lvl="1"/>
+            <a:r>
+              <a:rPr lang="en-US" altLang="ko-KR" dirty="0" smtClean="0"/>
+              <a:t>Data </a:t>
+            </a:r>
+            <a:r>
+              <a:rPr lang="en-US" altLang="ko-KR" dirty="0" smtClean="0"/>
+              <a:t>size = </a:t>
+            </a:r>
+            <a:r>
+              <a:rPr lang="en-US" altLang="ko-KR" dirty="0" smtClean="0"/>
+              <a:t>15,000</a:t>
+            </a:r>
+          </a:p>
+          <a:p>
+            <a:pPr lvl="1"/>
+            <a:r>
+              <a:rPr lang="en-US" altLang="ko-KR" dirty="0" err="1" smtClean="0"/>
+              <a:t>LogScore</a:t>
+            </a:r>
+            <a:r>
+              <a:rPr lang="en-US" altLang="ko-KR" dirty="0" smtClean="0"/>
+              <a:t> BAYES : </a:t>
+            </a:r>
+            <a:r>
+              <a:rPr lang="fi-FI" altLang="ko-KR" dirty="0"/>
+              <a:t>-</a:t>
+            </a:r>
+            <a:r>
+              <a:rPr lang="fi-FI" altLang="ko-KR" dirty="0" smtClean="0"/>
+              <a:t>28784.30315</a:t>
+            </a:r>
+          </a:p>
+          <a:p>
+            <a:pPr lvl="1"/>
             <a:endParaRPr lang="ko-KR" altLang="en-US" dirty="0"/>
           </a:p>
         </p:txBody>
       </p:sp>
-      <p:sp>
-        <p:nvSpPr>
-          <p:cNvPr id="20" name="모서리가 둥근 직사각형 19"/>
-          <p:cNvSpPr/>
+      <p:pic>
+        <p:nvPicPr>
+          <p:cNvPr id="5" name="그림 4"/>
+          <p:cNvPicPr>
+            <a:picLocks noChangeAspect="1"/>
+          </p:cNvPicPr>
           <p:nvPr/>
-        </p:nvSpPr>
+        </p:nvPicPr>
+        <p:blipFill>
+          <a:blip r:embed="rId2">
+            <a:extLst>
+              <a:ext uri="{28A0092B-C50C-407E-A947-70E740481C1C}">
+                <a14:useLocalDpi xmlns:a14="http://schemas.microsoft.com/office/drawing/2010/main" val="0"/>
+              </a:ext>
+            </a:extLst>
+          </a:blip>
+          <a:stretch>
+            <a:fillRect/>
+          </a:stretch>
+        </p:blipFill>
         <p:spPr>
           <a:xfrm>
-            <a:off x="2337884" y="2555087"/>
-            <a:ext cx="1656184" cy="648072"/>
+            <a:off x="6424286" y="2133600"/>
+            <a:ext cx="2057400" cy="3238500"/>
           </a:xfrm>
-          <a:prstGeom prst="roundRect">
+          <a:prstGeom prst="rect">
             <a:avLst/>
           </a:prstGeom>
-          <a:noFill/>
-          <a:ln>
-            <a:solidFill>
-              <a:schemeClr val="tx1"/>
-            </a:solidFill>
-          </a:ln>
         </p:spPr>
-        <p:style>
-          <a:lnRef idx="2">
-            <a:schemeClr val="accent1">
-              <a:shade val="50000"/>
-            </a:schemeClr>
-          </a:lnRef>
-          <a:fillRef idx="1">
-            <a:schemeClr val="accent1"/>
-          </a:fillRef>
-          <a:effectRef idx="0">
-            <a:schemeClr val="accent1"/>
-          </a:effectRef>
-          <a:fontRef idx="minor">
-            <a:schemeClr val="lt1"/>
-          </a:fontRef>
-        </p:style>
-        <p:txBody>
-          <a:bodyPr rtlCol="0" anchor="ctr"/>
-          <a:lstStyle/>
-          <a:p>
-            <a:pPr algn="ctr"/>
-            <a:r>
-              <a:rPr kumimoji="1" lang="en-US" altLang="ko-KR" sz="1600" dirty="0" smtClean="0">
-                <a:solidFill>
-                  <a:schemeClr val="tx1"/>
-                </a:solidFill>
-              </a:rPr>
-              <a:t>Visit to Asia</a:t>
-            </a:r>
-            <a:endParaRPr kumimoji="1" lang="ko-KR" altLang="en-US" sz="1600" dirty="0">
-              <a:solidFill>
-                <a:schemeClr val="tx1"/>
-              </a:solidFill>
-            </a:endParaRPr>
-          </a:p>
-        </p:txBody>
-      </p:sp>
-      <p:sp>
-        <p:nvSpPr>
-          <p:cNvPr id="21" name="모서리가 둥근 직사각형 20"/>
-          <p:cNvSpPr/>
-          <p:nvPr/>
-        </p:nvSpPr>
-        <p:spPr>
-          <a:xfrm>
-            <a:off x="5354616" y="2570949"/>
-            <a:ext cx="1656184" cy="699755"/>
-          </a:xfrm>
-          <a:prstGeom prst="roundRect">
-            <a:avLst/>
-          </a:prstGeom>
-          <a:noFill/>
-          <a:ln>
-            <a:solidFill>
-              <a:schemeClr val="tx1"/>
-            </a:solidFill>
-          </a:ln>
-        </p:spPr>
-        <p:style>
-          <a:lnRef idx="2">
-            <a:schemeClr val="accent1">
-              <a:shade val="50000"/>
-            </a:schemeClr>
-          </a:lnRef>
-          <a:fillRef idx="1">
-            <a:schemeClr val="accent1"/>
-          </a:fillRef>
-          <a:effectRef idx="0">
-            <a:schemeClr val="accent1"/>
-          </a:effectRef>
-          <a:fontRef idx="minor">
-            <a:schemeClr val="lt1"/>
-          </a:fontRef>
-        </p:style>
-        <p:txBody>
-          <a:bodyPr rtlCol="0" anchor="ctr"/>
-          <a:lstStyle/>
-          <a:p>
-            <a:pPr algn="ctr"/>
-            <a:r>
-              <a:rPr kumimoji="1" lang="en-US" altLang="ko-KR" sz="1600" smtClean="0">
-                <a:solidFill>
-                  <a:schemeClr val="tx1"/>
-                </a:solidFill>
-              </a:rPr>
-              <a:t>Smoker</a:t>
-            </a:r>
-            <a:endParaRPr kumimoji="1" lang="ko-KR" altLang="en-US" sz="1600" dirty="0">
-              <a:solidFill>
-                <a:schemeClr val="tx1"/>
-              </a:solidFill>
-            </a:endParaRPr>
-          </a:p>
-        </p:txBody>
-      </p:sp>
-      <p:sp>
-        <p:nvSpPr>
-          <p:cNvPr id="22" name="모서리가 둥근 직사각형 21"/>
-          <p:cNvSpPr/>
-          <p:nvPr/>
-        </p:nvSpPr>
-        <p:spPr>
-          <a:xfrm>
-            <a:off x="2337884" y="3575286"/>
-            <a:ext cx="1656184" cy="648072"/>
-          </a:xfrm>
-          <a:prstGeom prst="roundRect">
-            <a:avLst/>
-          </a:prstGeom>
-          <a:noFill/>
-          <a:ln>
-            <a:solidFill>
-              <a:schemeClr val="tx1"/>
-            </a:solidFill>
-          </a:ln>
-        </p:spPr>
-        <p:style>
-          <a:lnRef idx="2">
-            <a:schemeClr val="accent1">
-              <a:shade val="50000"/>
-            </a:schemeClr>
-          </a:lnRef>
-          <a:fillRef idx="1">
-            <a:schemeClr val="accent1"/>
-          </a:fillRef>
-          <a:effectRef idx="0">
-            <a:schemeClr val="accent1"/>
-          </a:effectRef>
-          <a:fontRef idx="minor">
-            <a:schemeClr val="lt1"/>
-          </a:fontRef>
-        </p:style>
-        <p:txBody>
-          <a:bodyPr rtlCol="0" anchor="ctr"/>
-          <a:lstStyle/>
-          <a:p>
-            <a:pPr algn="ctr"/>
-            <a:r>
-              <a:rPr kumimoji="1" lang="en-US" altLang="ko-KR" sz="1600" dirty="0" smtClean="0">
-                <a:solidFill>
-                  <a:schemeClr val="tx1"/>
-                </a:solidFill>
-              </a:rPr>
-              <a:t>Has </a:t>
-            </a:r>
-            <a:r>
-              <a:rPr kumimoji="1" lang="en-US" altLang="ko-KR" sz="1600" dirty="0" err="1" smtClean="0">
-                <a:solidFill>
-                  <a:schemeClr val="tx1"/>
-                </a:solidFill>
-              </a:rPr>
-              <a:t>Turberculosis</a:t>
-            </a:r>
-            <a:endParaRPr kumimoji="1" lang="ko-KR" altLang="en-US" sz="1600" dirty="0">
-              <a:solidFill>
-                <a:schemeClr val="tx1"/>
-              </a:solidFill>
-            </a:endParaRPr>
-          </a:p>
-        </p:txBody>
-      </p:sp>
-      <p:sp>
-        <p:nvSpPr>
-          <p:cNvPr id="23" name="모서리가 둥근 직사각형 22"/>
-          <p:cNvSpPr/>
-          <p:nvPr/>
-        </p:nvSpPr>
-        <p:spPr>
-          <a:xfrm>
-            <a:off x="4424604" y="3575286"/>
-            <a:ext cx="1656184" cy="648072"/>
-          </a:xfrm>
-          <a:prstGeom prst="roundRect">
-            <a:avLst/>
-          </a:prstGeom>
-          <a:noFill/>
-          <a:ln>
-            <a:solidFill>
-              <a:schemeClr val="tx1"/>
-            </a:solidFill>
-          </a:ln>
-        </p:spPr>
-        <p:style>
-          <a:lnRef idx="2">
-            <a:schemeClr val="accent1">
-              <a:shade val="50000"/>
-            </a:schemeClr>
-          </a:lnRef>
-          <a:fillRef idx="1">
-            <a:schemeClr val="accent1"/>
-          </a:fillRef>
-          <a:effectRef idx="0">
-            <a:schemeClr val="accent1"/>
-          </a:effectRef>
-          <a:fontRef idx="minor">
-            <a:schemeClr val="lt1"/>
-          </a:fontRef>
-        </p:style>
-        <p:txBody>
-          <a:bodyPr rtlCol="0" anchor="ctr"/>
-          <a:lstStyle/>
-          <a:p>
-            <a:pPr algn="ctr"/>
-            <a:r>
-              <a:rPr kumimoji="1" lang="en-US" altLang="ko-KR" sz="1600" dirty="0" smtClean="0">
-                <a:solidFill>
-                  <a:schemeClr val="tx1"/>
-                </a:solidFill>
-              </a:rPr>
-              <a:t>Has Lung Cancer</a:t>
-            </a:r>
-            <a:endParaRPr kumimoji="1" lang="ko-KR" altLang="en-US" sz="1600" dirty="0">
-              <a:solidFill>
-                <a:schemeClr val="tx1"/>
-              </a:solidFill>
-            </a:endParaRPr>
-          </a:p>
-        </p:txBody>
-      </p:sp>
-      <p:sp>
-        <p:nvSpPr>
-          <p:cNvPr id="24" name="모서리가 둥근 직사각형 23"/>
-          <p:cNvSpPr/>
-          <p:nvPr/>
-        </p:nvSpPr>
-        <p:spPr>
-          <a:xfrm>
-            <a:off x="6558669" y="3575286"/>
-            <a:ext cx="1656184" cy="648072"/>
-          </a:xfrm>
-          <a:prstGeom prst="roundRect">
-            <a:avLst/>
-          </a:prstGeom>
-          <a:noFill/>
-          <a:ln>
-            <a:solidFill>
-              <a:schemeClr val="tx1"/>
-            </a:solidFill>
-          </a:ln>
-        </p:spPr>
-        <p:style>
-          <a:lnRef idx="2">
-            <a:schemeClr val="accent1">
-              <a:shade val="50000"/>
-            </a:schemeClr>
-          </a:lnRef>
-          <a:fillRef idx="1">
-            <a:schemeClr val="accent1"/>
-          </a:fillRef>
-          <a:effectRef idx="0">
-            <a:schemeClr val="accent1"/>
-          </a:effectRef>
-          <a:fontRef idx="minor">
-            <a:schemeClr val="lt1"/>
-          </a:fontRef>
-        </p:style>
-        <p:txBody>
-          <a:bodyPr rtlCol="0" anchor="ctr"/>
-          <a:lstStyle/>
-          <a:p>
-            <a:pPr algn="ctr"/>
-            <a:r>
-              <a:rPr kumimoji="1" lang="en-US" altLang="ko-KR" sz="1600" dirty="0" smtClean="0">
-                <a:solidFill>
-                  <a:schemeClr val="tx1"/>
-                </a:solidFill>
-              </a:rPr>
-              <a:t>Has Bronchitis</a:t>
-            </a:r>
-            <a:endParaRPr kumimoji="1" lang="ko-KR" altLang="en-US" sz="1600" dirty="0">
-              <a:solidFill>
-                <a:schemeClr val="tx1"/>
-              </a:solidFill>
-            </a:endParaRPr>
-          </a:p>
-        </p:txBody>
-      </p:sp>
-      <p:sp>
-        <p:nvSpPr>
-          <p:cNvPr id="25" name="모서리가 둥근 직사각형 24"/>
-          <p:cNvSpPr/>
-          <p:nvPr/>
-        </p:nvSpPr>
-        <p:spPr>
-          <a:xfrm>
-            <a:off x="4426116" y="4643319"/>
-            <a:ext cx="1656184" cy="648072"/>
-          </a:xfrm>
-          <a:prstGeom prst="roundRect">
-            <a:avLst/>
-          </a:prstGeom>
-          <a:noFill/>
-          <a:ln>
-            <a:solidFill>
-              <a:schemeClr val="tx1"/>
-            </a:solidFill>
-          </a:ln>
-        </p:spPr>
-        <p:style>
-          <a:lnRef idx="2">
-            <a:schemeClr val="accent1">
-              <a:shade val="50000"/>
-            </a:schemeClr>
-          </a:lnRef>
-          <a:fillRef idx="1">
-            <a:schemeClr val="accent1"/>
-          </a:fillRef>
-          <a:effectRef idx="0">
-            <a:schemeClr val="accent1"/>
-          </a:effectRef>
-          <a:fontRef idx="minor">
-            <a:schemeClr val="lt1"/>
-          </a:fontRef>
-        </p:style>
-        <p:txBody>
-          <a:bodyPr rtlCol="0" anchor="ctr"/>
-          <a:lstStyle/>
-          <a:p>
-            <a:pPr algn="ctr"/>
-            <a:r>
-              <a:rPr kumimoji="1" lang="en-US" altLang="ko-KR" sz="1600" smtClean="0">
-                <a:solidFill>
-                  <a:schemeClr val="tx1"/>
-                </a:solidFill>
-              </a:rPr>
-              <a:t>Tuberculosis or Cancer</a:t>
-            </a:r>
-            <a:endParaRPr kumimoji="1" lang="ko-KR" altLang="en-US" sz="1600" dirty="0">
-              <a:solidFill>
-                <a:schemeClr val="tx1"/>
-              </a:solidFill>
-            </a:endParaRPr>
-          </a:p>
-        </p:txBody>
-      </p:sp>
-      <p:sp>
-        <p:nvSpPr>
-          <p:cNvPr id="26" name="모서리가 둥근 직사각형 25"/>
-          <p:cNvSpPr/>
-          <p:nvPr/>
-        </p:nvSpPr>
-        <p:spPr>
-          <a:xfrm>
-            <a:off x="2337884" y="5540496"/>
-            <a:ext cx="1656184" cy="648072"/>
-          </a:xfrm>
-          <a:prstGeom prst="roundRect">
-            <a:avLst/>
-          </a:prstGeom>
-          <a:noFill/>
-          <a:ln>
-            <a:solidFill>
-              <a:schemeClr val="tx1"/>
-            </a:solidFill>
-          </a:ln>
-        </p:spPr>
-        <p:style>
-          <a:lnRef idx="2">
-            <a:schemeClr val="accent1">
-              <a:shade val="50000"/>
-            </a:schemeClr>
-          </a:lnRef>
-          <a:fillRef idx="1">
-            <a:schemeClr val="accent1"/>
-          </a:fillRef>
-          <a:effectRef idx="0">
-            <a:schemeClr val="accent1"/>
-          </a:effectRef>
-          <a:fontRef idx="minor">
-            <a:schemeClr val="lt1"/>
-          </a:fontRef>
-        </p:style>
-        <p:txBody>
-          <a:bodyPr rtlCol="0" anchor="ctr"/>
-          <a:lstStyle/>
-          <a:p>
-            <a:pPr algn="ctr"/>
-            <a:r>
-              <a:rPr kumimoji="1" lang="en-US" altLang="ko-KR" sz="1600" dirty="0" err="1" smtClean="0">
-                <a:solidFill>
-                  <a:schemeClr val="tx1"/>
-                </a:solidFill>
-              </a:rPr>
-              <a:t>Xray</a:t>
-            </a:r>
-            <a:r>
-              <a:rPr kumimoji="1" lang="en-US" altLang="ko-KR" sz="1600" dirty="0" smtClean="0">
-                <a:solidFill>
-                  <a:schemeClr val="tx1"/>
-                </a:solidFill>
-              </a:rPr>
-              <a:t> Result</a:t>
-            </a:r>
-            <a:endParaRPr kumimoji="1" lang="ko-KR" altLang="en-US" sz="1600" dirty="0">
-              <a:solidFill>
-                <a:schemeClr val="tx1"/>
-              </a:solidFill>
-            </a:endParaRPr>
-          </a:p>
-        </p:txBody>
-      </p:sp>
-      <p:sp>
-        <p:nvSpPr>
-          <p:cNvPr id="27" name="모서리가 둥근 직사각형 26"/>
-          <p:cNvSpPr/>
-          <p:nvPr/>
-        </p:nvSpPr>
-        <p:spPr>
-          <a:xfrm>
-            <a:off x="6558669" y="5563011"/>
-            <a:ext cx="1656184" cy="648072"/>
-          </a:xfrm>
-          <a:prstGeom prst="roundRect">
-            <a:avLst/>
-          </a:prstGeom>
-          <a:noFill/>
-          <a:ln>
-            <a:solidFill>
-              <a:schemeClr val="tx1"/>
-            </a:solidFill>
-          </a:ln>
-        </p:spPr>
-        <p:style>
-          <a:lnRef idx="2">
-            <a:schemeClr val="accent1">
-              <a:shade val="50000"/>
-            </a:schemeClr>
-          </a:lnRef>
-          <a:fillRef idx="1">
-            <a:schemeClr val="accent1"/>
-          </a:fillRef>
-          <a:effectRef idx="0">
-            <a:schemeClr val="accent1"/>
-          </a:effectRef>
-          <a:fontRef idx="minor">
-            <a:schemeClr val="lt1"/>
-          </a:fontRef>
-        </p:style>
-        <p:txBody>
-          <a:bodyPr rtlCol="0" anchor="ctr"/>
-          <a:lstStyle/>
-          <a:p>
-            <a:pPr algn="ctr"/>
-            <a:r>
-              <a:rPr kumimoji="1" lang="en-US" altLang="ko-KR" sz="1600" dirty="0" smtClean="0">
-                <a:solidFill>
-                  <a:schemeClr val="tx1"/>
-                </a:solidFill>
-              </a:rPr>
-              <a:t>Dyspnea</a:t>
-            </a:r>
-            <a:endParaRPr kumimoji="1" lang="ko-KR" altLang="en-US" sz="1600" dirty="0">
-              <a:solidFill>
-                <a:schemeClr val="tx1"/>
-              </a:solidFill>
-            </a:endParaRPr>
-          </a:p>
-        </p:txBody>
-      </p:sp>
-      <p:cxnSp>
-        <p:nvCxnSpPr>
-          <p:cNvPr id="28" name="직선 화살표 연결선 27"/>
-          <p:cNvCxnSpPr/>
-          <p:nvPr/>
-        </p:nvCxnSpPr>
-        <p:spPr>
-          <a:xfrm>
-            <a:off x="6558669" y="3270704"/>
-            <a:ext cx="452131" cy="304582"/>
-          </a:xfrm>
-          <a:prstGeom prst="straightConnector1">
-            <a:avLst/>
-          </a:prstGeom>
-          <a:ln>
-            <a:solidFill>
-              <a:schemeClr val="tx1"/>
-            </a:solidFill>
-            <a:tailEnd type="triangle"/>
-          </a:ln>
-        </p:spPr>
-        <p:style>
-          <a:lnRef idx="1">
-            <a:schemeClr val="accent1"/>
-          </a:lnRef>
-          <a:fillRef idx="0">
-            <a:schemeClr val="accent1"/>
-          </a:fillRef>
-          <a:effectRef idx="0">
-            <a:schemeClr val="accent1"/>
-          </a:effectRef>
-          <a:fontRef idx="minor">
-            <a:schemeClr val="tx1"/>
-          </a:fontRef>
-        </p:style>
-      </p:cxnSp>
-      <p:cxnSp>
-        <p:nvCxnSpPr>
-          <p:cNvPr id="29" name="직선 화살표 연결선 28"/>
-          <p:cNvCxnSpPr>
-            <a:endCxn id="23" idx="0"/>
-          </p:cNvCxnSpPr>
-          <p:nvPr/>
-        </p:nvCxnSpPr>
-        <p:spPr>
-          <a:xfrm flipH="1">
-            <a:off x="5252696" y="3270704"/>
-            <a:ext cx="472276" cy="304582"/>
-          </a:xfrm>
-          <a:prstGeom prst="straightConnector1">
-            <a:avLst/>
-          </a:prstGeom>
-          <a:ln>
-            <a:solidFill>
-              <a:schemeClr val="tx1"/>
-            </a:solidFill>
-            <a:tailEnd type="triangle"/>
-          </a:ln>
-        </p:spPr>
-        <p:style>
-          <a:lnRef idx="1">
-            <a:schemeClr val="accent1"/>
-          </a:lnRef>
-          <a:fillRef idx="0">
-            <a:schemeClr val="accent1"/>
-          </a:fillRef>
-          <a:effectRef idx="0">
-            <a:schemeClr val="accent1"/>
-          </a:effectRef>
-          <a:fontRef idx="minor">
-            <a:schemeClr val="tx1"/>
-          </a:fontRef>
-        </p:style>
-      </p:cxnSp>
-      <p:cxnSp>
-        <p:nvCxnSpPr>
-          <p:cNvPr id="30" name="직선 화살표 연결선 29"/>
-          <p:cNvCxnSpPr/>
-          <p:nvPr/>
-        </p:nvCxnSpPr>
-        <p:spPr>
-          <a:xfrm>
-            <a:off x="5226899" y="4223358"/>
-            <a:ext cx="534" cy="419961"/>
-          </a:xfrm>
-          <a:prstGeom prst="straightConnector1">
-            <a:avLst/>
-          </a:prstGeom>
-          <a:ln>
-            <a:solidFill>
-              <a:schemeClr val="tx1"/>
-            </a:solidFill>
-            <a:tailEnd type="triangle"/>
-          </a:ln>
-        </p:spPr>
-        <p:style>
-          <a:lnRef idx="1">
-            <a:schemeClr val="accent1"/>
-          </a:lnRef>
-          <a:fillRef idx="0">
-            <a:schemeClr val="accent1"/>
-          </a:fillRef>
-          <a:effectRef idx="0">
-            <a:schemeClr val="accent1"/>
-          </a:effectRef>
-          <a:fontRef idx="minor">
-            <a:schemeClr val="tx1"/>
-          </a:fontRef>
-        </p:style>
-      </p:cxnSp>
-      <p:cxnSp>
-        <p:nvCxnSpPr>
-          <p:cNvPr id="31" name="직선 화살표 연결선 30"/>
-          <p:cNvCxnSpPr/>
-          <p:nvPr/>
-        </p:nvCxnSpPr>
-        <p:spPr>
-          <a:xfrm>
-            <a:off x="3768472" y="4223357"/>
-            <a:ext cx="841745" cy="419962"/>
-          </a:xfrm>
-          <a:prstGeom prst="straightConnector1">
-            <a:avLst/>
-          </a:prstGeom>
-          <a:ln>
-            <a:solidFill>
-              <a:schemeClr val="tx1"/>
-            </a:solidFill>
-            <a:tailEnd type="triangle"/>
-          </a:ln>
-        </p:spPr>
-        <p:style>
-          <a:lnRef idx="1">
-            <a:schemeClr val="accent1"/>
-          </a:lnRef>
-          <a:fillRef idx="0">
-            <a:schemeClr val="accent1"/>
-          </a:fillRef>
-          <a:effectRef idx="0">
-            <a:schemeClr val="accent1"/>
-          </a:effectRef>
-          <a:fontRef idx="minor">
-            <a:schemeClr val="tx1"/>
-          </a:fontRef>
-        </p:style>
-      </p:cxnSp>
-      <p:cxnSp>
-        <p:nvCxnSpPr>
-          <p:cNvPr id="32" name="직선 화살표 연결선 31"/>
-          <p:cNvCxnSpPr/>
-          <p:nvPr/>
-        </p:nvCxnSpPr>
-        <p:spPr>
-          <a:xfrm flipH="1">
-            <a:off x="3850052" y="5291391"/>
-            <a:ext cx="749993" cy="249105"/>
-          </a:xfrm>
-          <a:prstGeom prst="straightConnector1">
-            <a:avLst/>
-          </a:prstGeom>
-          <a:ln>
-            <a:solidFill>
-              <a:schemeClr val="tx1"/>
-            </a:solidFill>
-            <a:tailEnd type="triangle"/>
-          </a:ln>
-        </p:spPr>
-        <p:style>
-          <a:lnRef idx="1">
-            <a:schemeClr val="accent1"/>
-          </a:lnRef>
-          <a:fillRef idx="0">
-            <a:schemeClr val="accent1"/>
-          </a:fillRef>
-          <a:effectRef idx="0">
-            <a:schemeClr val="accent1"/>
-          </a:effectRef>
-          <a:fontRef idx="minor">
-            <a:schemeClr val="tx1"/>
-          </a:fontRef>
-        </p:style>
-      </p:cxnSp>
-      <p:cxnSp>
-        <p:nvCxnSpPr>
-          <p:cNvPr id="33" name="직선 화살표 연결선 32"/>
-          <p:cNvCxnSpPr/>
-          <p:nvPr/>
-        </p:nvCxnSpPr>
-        <p:spPr>
-          <a:xfrm>
-            <a:off x="6010292" y="5282163"/>
-            <a:ext cx="648072" cy="276790"/>
-          </a:xfrm>
-          <a:prstGeom prst="straightConnector1">
-            <a:avLst/>
-          </a:prstGeom>
-          <a:ln>
-            <a:solidFill>
-              <a:schemeClr val="tx1"/>
-            </a:solidFill>
-            <a:tailEnd type="triangle"/>
-          </a:ln>
-        </p:spPr>
-        <p:style>
-          <a:lnRef idx="1">
-            <a:schemeClr val="accent1"/>
-          </a:lnRef>
-          <a:fillRef idx="0">
-            <a:schemeClr val="accent1"/>
-          </a:fillRef>
-          <a:effectRef idx="0">
-            <a:schemeClr val="accent1"/>
-          </a:effectRef>
-          <a:fontRef idx="minor">
-            <a:schemeClr val="tx1"/>
-          </a:fontRef>
-        </p:style>
-      </p:cxnSp>
-      <p:cxnSp>
-        <p:nvCxnSpPr>
-          <p:cNvPr id="34" name="직선 화살표 연결선 33"/>
-          <p:cNvCxnSpPr/>
-          <p:nvPr/>
-        </p:nvCxnSpPr>
-        <p:spPr>
-          <a:xfrm>
-            <a:off x="3901012" y="3189317"/>
-            <a:ext cx="3082588" cy="2369636"/>
-          </a:xfrm>
-          <a:prstGeom prst="straightConnector1">
-            <a:avLst/>
-          </a:prstGeom>
-          <a:ln>
-            <a:solidFill>
-              <a:schemeClr val="tx1"/>
-            </a:solidFill>
-            <a:tailEnd type="triangle"/>
-          </a:ln>
-        </p:spPr>
-        <p:style>
-          <a:lnRef idx="1">
-            <a:schemeClr val="accent1"/>
-          </a:lnRef>
-          <a:fillRef idx="0">
-            <a:schemeClr val="accent1"/>
-          </a:fillRef>
-          <a:effectRef idx="0">
-            <a:schemeClr val="accent1"/>
-          </a:effectRef>
-          <a:fontRef idx="minor">
-            <a:schemeClr val="tx1"/>
-          </a:fontRef>
-        </p:style>
-      </p:cxnSp>
-      <p:cxnSp>
-        <p:nvCxnSpPr>
-          <p:cNvPr id="35" name="직선 화살표 연결선 34"/>
-          <p:cNvCxnSpPr>
-            <a:endCxn id="27" idx="0"/>
-          </p:cNvCxnSpPr>
-          <p:nvPr/>
-        </p:nvCxnSpPr>
-        <p:spPr>
-          <a:xfrm>
-            <a:off x="7366422" y="4223358"/>
-            <a:ext cx="20339" cy="1339653"/>
-          </a:xfrm>
-          <a:prstGeom prst="straightConnector1">
-            <a:avLst/>
-          </a:prstGeom>
-          <a:ln>
-            <a:solidFill>
-              <a:schemeClr val="tx1"/>
-            </a:solidFill>
-            <a:tailEnd type="triangle"/>
-          </a:ln>
-        </p:spPr>
-        <p:style>
-          <a:lnRef idx="1">
-            <a:schemeClr val="accent1"/>
-          </a:lnRef>
-          <a:fillRef idx="0">
-            <a:schemeClr val="accent1"/>
-          </a:fillRef>
-          <a:effectRef idx="0">
-            <a:schemeClr val="accent1"/>
-          </a:effectRef>
-          <a:fontRef idx="minor">
-            <a:schemeClr val="tx1"/>
-          </a:fontRef>
-        </p:style>
-      </p:cxnSp>
+      </p:pic>
     </p:spTree>
     <p:extLst>
       <p:ext uri="{BB962C8B-B14F-4D97-AF65-F5344CB8AC3E}">
-        <p14:creationId xmlns:p14="http://schemas.microsoft.com/office/powerpoint/2010/main" val="260997688"/>
+        <p14:creationId xmlns:p14="http://schemas.microsoft.com/office/powerpoint/2010/main" val="1182198755"/>
       </p:ext>
     </p:extLst>
   </p:cSld>
@@ -7085,12 +6480,9 @@
             </a:r>
             <a:r>
               <a:rPr lang="ko-KR" altLang="en-US" dirty="0" smtClean="0"/>
-              <a:t>학</a:t>
-            </a:r>
-            <a:r>
-              <a:rPr lang="ko-KR" altLang="en-US" dirty="0"/>
-              <a:t>습</a:t>
-            </a:r>
+              <a:t>학습</a:t>
+            </a:r>
+            <a:endParaRPr lang="ko-KR" altLang="en-US" dirty="0"/>
           </a:p>
         </p:txBody>
       </p:sp>
@@ -7109,754 +6501,158 @@
           <a:bodyPr/>
           <a:lstStyle/>
           <a:p>
-            <a:r>
-              <a:rPr lang="en-US" altLang="ko-KR" dirty="0" smtClean="0"/>
-              <a:t>Data size = 5,000</a:t>
-            </a:r>
+            <a:pPr marL="0" marR="0" lvl="0" indent="0" defTabSz="914400" eaLnBrk="1" fontAlgn="auto" latinLnBrk="0" hangingPunct="1">
+              <a:lnSpc>
+                <a:spcPct val="100000"/>
+              </a:lnSpc>
+              <a:spcBef>
+                <a:spcPts val="0"/>
+              </a:spcBef>
+              <a:spcAft>
+                <a:spcPts val="0"/>
+              </a:spcAft>
+              <a:buClrTx/>
+              <a:buSzTx/>
+              <a:buFontTx/>
+              <a:buNone/>
+              <a:tabLst/>
+              <a:defRPr/>
+            </a:pPr>
+            <a:r>
+              <a:rPr lang="en-US" altLang="ko-KR" dirty="0"/>
+              <a:t>2</a:t>
+            </a:r>
+            <a:r>
+              <a:rPr lang="en-US" altLang="ko-KR" dirty="0" smtClean="0"/>
+              <a:t>)</a:t>
+            </a:r>
+            <a:r>
+              <a:rPr lang="ko-KR" altLang="en-US" dirty="0" smtClean="0"/>
+              <a:t> </a:t>
+            </a:r>
+            <a:r>
+              <a:rPr lang="en-US" altLang="ko-KR" dirty="0" smtClean="0"/>
+              <a:t>Asia Network</a:t>
+            </a:r>
+          </a:p>
+          <a:p>
+            <a:pPr lvl="1" eaLnBrk="1" fontAlgn="auto" hangingPunct="1">
+              <a:spcBef>
+                <a:spcPts val="0"/>
+              </a:spcBef>
+              <a:spcAft>
+                <a:spcPts val="0"/>
+              </a:spcAft>
+              <a:buClrTx/>
+              <a:buFont typeface="Arial" charset="0"/>
+              <a:buChar char="•"/>
+            </a:pPr>
+            <a:r>
+              <a:rPr lang="ko-KR" altLang="en-US" dirty="0" smtClean="0"/>
+              <a:t>노드 수 </a:t>
+            </a:r>
+            <a:r>
+              <a:rPr lang="en-US" altLang="ko-KR" dirty="0" smtClean="0"/>
+              <a:t>:</a:t>
+            </a:r>
+            <a:r>
+              <a:rPr lang="ko-KR" altLang="en-US" dirty="0" smtClean="0"/>
+              <a:t> </a:t>
+            </a:r>
+            <a:r>
+              <a:rPr lang="en-US" altLang="ko-KR" dirty="0" smtClean="0"/>
+              <a:t>8</a:t>
+            </a:r>
+          </a:p>
+          <a:p>
+            <a:pPr lvl="1" eaLnBrk="1" fontAlgn="auto" hangingPunct="1">
+              <a:spcBef>
+                <a:spcPts val="0"/>
+              </a:spcBef>
+              <a:spcAft>
+                <a:spcPts val="0"/>
+              </a:spcAft>
+              <a:buClrTx/>
+              <a:buFont typeface="Arial" charset="0"/>
+              <a:buChar char="•"/>
+            </a:pPr>
+            <a:r>
+              <a:rPr lang="ko-KR" altLang="en-US" dirty="0" smtClean="0"/>
+              <a:t>간선 수 </a:t>
+            </a:r>
+            <a:r>
+              <a:rPr lang="en-US" altLang="ko-KR" dirty="0" smtClean="0"/>
+              <a:t>:</a:t>
+            </a:r>
+            <a:r>
+              <a:rPr lang="ko-KR" altLang="en-US" dirty="0" smtClean="0"/>
+              <a:t> </a:t>
+            </a:r>
+            <a:r>
+              <a:rPr lang="en-US" altLang="ko-KR" dirty="0" smtClean="0"/>
+              <a:t>8</a:t>
+            </a:r>
+            <a:endParaRPr lang="en-US" altLang="ko-KR" dirty="0" smtClean="0"/>
+          </a:p>
+          <a:p>
+            <a:pPr marL="0" marR="0" lvl="0" indent="0" defTabSz="914400" eaLnBrk="1" fontAlgn="auto" latinLnBrk="0" hangingPunct="1">
+              <a:lnSpc>
+                <a:spcPct val="100000"/>
+              </a:lnSpc>
+              <a:spcBef>
+                <a:spcPts val="0"/>
+              </a:spcBef>
+              <a:spcAft>
+                <a:spcPts val="0"/>
+              </a:spcAft>
+              <a:buClrTx/>
+              <a:buSzTx/>
+              <a:buFontTx/>
+              <a:buNone/>
+              <a:tabLst/>
+              <a:defRPr/>
+            </a:pPr>
             <a:endParaRPr lang="ko-KR" altLang="en-US" dirty="0"/>
           </a:p>
         </p:txBody>
       </p:sp>
-      <p:sp>
-        <p:nvSpPr>
-          <p:cNvPr id="19" name="모서리가 둥근 직사각형 18"/>
-          <p:cNvSpPr/>
+      <p:pic>
+        <p:nvPicPr>
+          <p:cNvPr id="4" name="그림 3"/>
+          <p:cNvPicPr>
+            <a:picLocks noChangeAspect="1"/>
+          </p:cNvPicPr>
           <p:nvPr/>
-        </p:nvSpPr>
+        </p:nvPicPr>
+        <p:blipFill>
+          <a:blip r:embed="rId2">
+            <a:extLst>
+              <a:ext uri="{28A0092B-C50C-407E-A947-70E740481C1C}">
+                <a14:useLocalDpi xmlns:a14="http://schemas.microsoft.com/office/drawing/2010/main" val="0"/>
+              </a:ext>
+            </a:extLst>
+          </a:blip>
+          <a:stretch>
+            <a:fillRect/>
+          </a:stretch>
+        </p:blipFill>
         <p:spPr>
           <a:xfrm>
-            <a:off x="2339752" y="2602384"/>
-            <a:ext cx="1656184" cy="648072"/>
+            <a:off x="4289539" y="2437356"/>
+            <a:ext cx="4451541" cy="3431088"/>
           </a:xfrm>
-          <a:prstGeom prst="roundRect">
+          <a:prstGeom prst="rect">
             <a:avLst/>
           </a:prstGeom>
-          <a:noFill/>
-          <a:ln>
-            <a:solidFill>
-              <a:schemeClr val="tx1"/>
-            </a:solidFill>
-          </a:ln>
+          <a:effectLst>
+            <a:softEdge rad="63500"/>
+          </a:effectLst>
         </p:spPr>
-        <p:style>
-          <a:lnRef idx="2">
-            <a:schemeClr val="accent1">
-              <a:shade val="50000"/>
-            </a:schemeClr>
-          </a:lnRef>
-          <a:fillRef idx="1">
-            <a:schemeClr val="accent1"/>
-          </a:fillRef>
-          <a:effectRef idx="0">
-            <a:schemeClr val="accent1"/>
-          </a:effectRef>
-          <a:fontRef idx="minor">
-            <a:schemeClr val="lt1"/>
-          </a:fontRef>
-        </p:style>
-        <p:txBody>
-          <a:bodyPr rtlCol="0" anchor="ctr"/>
-          <a:lstStyle/>
-          <a:p>
-            <a:pPr algn="ctr"/>
-            <a:r>
-              <a:rPr kumimoji="1" lang="en-US" altLang="ko-KR" sz="1600" dirty="0" smtClean="0">
-                <a:solidFill>
-                  <a:schemeClr val="tx1"/>
-                </a:solidFill>
-              </a:rPr>
-              <a:t>Visit to Asia</a:t>
-            </a:r>
-            <a:endParaRPr kumimoji="1" lang="ko-KR" altLang="en-US" sz="1600" dirty="0">
-              <a:solidFill>
-                <a:schemeClr val="tx1"/>
-              </a:solidFill>
-            </a:endParaRPr>
-          </a:p>
-        </p:txBody>
-      </p:sp>
-      <p:sp>
-        <p:nvSpPr>
-          <p:cNvPr id="20" name="모서리가 둥근 직사각형 19"/>
-          <p:cNvSpPr/>
-          <p:nvPr/>
-        </p:nvSpPr>
-        <p:spPr>
-          <a:xfrm>
-            <a:off x="5356484" y="2618246"/>
-            <a:ext cx="1656184" cy="699755"/>
-          </a:xfrm>
-          <a:prstGeom prst="roundRect">
-            <a:avLst/>
-          </a:prstGeom>
-          <a:noFill/>
-          <a:ln>
-            <a:solidFill>
-              <a:schemeClr val="tx1"/>
-            </a:solidFill>
-          </a:ln>
-        </p:spPr>
-        <p:style>
-          <a:lnRef idx="2">
-            <a:schemeClr val="accent1">
-              <a:shade val="50000"/>
-            </a:schemeClr>
-          </a:lnRef>
-          <a:fillRef idx="1">
-            <a:schemeClr val="accent1"/>
-          </a:fillRef>
-          <a:effectRef idx="0">
-            <a:schemeClr val="accent1"/>
-          </a:effectRef>
-          <a:fontRef idx="minor">
-            <a:schemeClr val="lt1"/>
-          </a:fontRef>
-        </p:style>
-        <p:txBody>
-          <a:bodyPr rtlCol="0" anchor="ctr"/>
-          <a:lstStyle/>
-          <a:p>
-            <a:pPr algn="ctr"/>
-            <a:r>
-              <a:rPr kumimoji="1" lang="en-US" altLang="ko-KR" sz="1600" smtClean="0">
-                <a:solidFill>
-                  <a:schemeClr val="tx1"/>
-                </a:solidFill>
-              </a:rPr>
-              <a:t>Smoker</a:t>
-            </a:r>
-            <a:endParaRPr kumimoji="1" lang="ko-KR" altLang="en-US" sz="1600" dirty="0">
-              <a:solidFill>
-                <a:schemeClr val="tx1"/>
-              </a:solidFill>
-            </a:endParaRPr>
-          </a:p>
-        </p:txBody>
-      </p:sp>
-      <p:sp>
-        <p:nvSpPr>
-          <p:cNvPr id="21" name="모서리가 둥근 직사각형 20"/>
-          <p:cNvSpPr/>
-          <p:nvPr/>
-        </p:nvSpPr>
-        <p:spPr>
-          <a:xfrm>
-            <a:off x="2339752" y="3622583"/>
-            <a:ext cx="1656184" cy="648072"/>
-          </a:xfrm>
-          <a:prstGeom prst="roundRect">
-            <a:avLst/>
-          </a:prstGeom>
-          <a:noFill/>
-          <a:ln>
-            <a:solidFill>
-              <a:schemeClr val="tx1"/>
-            </a:solidFill>
-          </a:ln>
-        </p:spPr>
-        <p:style>
-          <a:lnRef idx="2">
-            <a:schemeClr val="accent1">
-              <a:shade val="50000"/>
-            </a:schemeClr>
-          </a:lnRef>
-          <a:fillRef idx="1">
-            <a:schemeClr val="accent1"/>
-          </a:fillRef>
-          <a:effectRef idx="0">
-            <a:schemeClr val="accent1"/>
-          </a:effectRef>
-          <a:fontRef idx="minor">
-            <a:schemeClr val="lt1"/>
-          </a:fontRef>
-        </p:style>
-        <p:txBody>
-          <a:bodyPr rtlCol="0" anchor="ctr"/>
-          <a:lstStyle/>
-          <a:p>
-            <a:pPr algn="ctr"/>
-            <a:r>
-              <a:rPr kumimoji="1" lang="en-US" altLang="ko-KR" sz="1600" dirty="0" smtClean="0">
-                <a:solidFill>
-                  <a:schemeClr val="tx1"/>
-                </a:solidFill>
-              </a:rPr>
-              <a:t>Has </a:t>
-            </a:r>
-            <a:r>
-              <a:rPr kumimoji="1" lang="en-US" altLang="ko-KR" sz="1600" dirty="0" err="1" smtClean="0">
-                <a:solidFill>
-                  <a:schemeClr val="tx1"/>
-                </a:solidFill>
-              </a:rPr>
-              <a:t>Turberculosis</a:t>
-            </a:r>
-            <a:endParaRPr kumimoji="1" lang="ko-KR" altLang="en-US" sz="1600" dirty="0">
-              <a:solidFill>
-                <a:schemeClr val="tx1"/>
-              </a:solidFill>
-            </a:endParaRPr>
-          </a:p>
-        </p:txBody>
-      </p:sp>
-      <p:sp>
-        <p:nvSpPr>
-          <p:cNvPr id="22" name="모서리가 둥근 직사각형 21"/>
-          <p:cNvSpPr/>
-          <p:nvPr/>
-        </p:nvSpPr>
-        <p:spPr>
-          <a:xfrm>
-            <a:off x="4426472" y="3622583"/>
-            <a:ext cx="1656184" cy="648072"/>
-          </a:xfrm>
-          <a:prstGeom prst="roundRect">
-            <a:avLst/>
-          </a:prstGeom>
-          <a:noFill/>
-          <a:ln>
-            <a:solidFill>
-              <a:schemeClr val="tx1"/>
-            </a:solidFill>
-          </a:ln>
-        </p:spPr>
-        <p:style>
-          <a:lnRef idx="2">
-            <a:schemeClr val="accent1">
-              <a:shade val="50000"/>
-            </a:schemeClr>
-          </a:lnRef>
-          <a:fillRef idx="1">
-            <a:schemeClr val="accent1"/>
-          </a:fillRef>
-          <a:effectRef idx="0">
-            <a:schemeClr val="accent1"/>
-          </a:effectRef>
-          <a:fontRef idx="minor">
-            <a:schemeClr val="lt1"/>
-          </a:fontRef>
-        </p:style>
-        <p:txBody>
-          <a:bodyPr rtlCol="0" anchor="ctr"/>
-          <a:lstStyle/>
-          <a:p>
-            <a:pPr algn="ctr"/>
-            <a:r>
-              <a:rPr kumimoji="1" lang="en-US" altLang="ko-KR" sz="1600" dirty="0" smtClean="0">
-                <a:solidFill>
-                  <a:schemeClr val="tx1"/>
-                </a:solidFill>
-              </a:rPr>
-              <a:t>Has Lung Cancer</a:t>
-            </a:r>
-            <a:endParaRPr kumimoji="1" lang="ko-KR" altLang="en-US" sz="1600" dirty="0">
-              <a:solidFill>
-                <a:schemeClr val="tx1"/>
-              </a:solidFill>
-            </a:endParaRPr>
-          </a:p>
-        </p:txBody>
-      </p:sp>
-      <p:sp>
-        <p:nvSpPr>
-          <p:cNvPr id="23" name="모서리가 둥근 직사각형 22"/>
-          <p:cNvSpPr/>
-          <p:nvPr/>
-        </p:nvSpPr>
-        <p:spPr>
-          <a:xfrm>
-            <a:off x="6560537" y="3622583"/>
-            <a:ext cx="1656184" cy="648072"/>
-          </a:xfrm>
-          <a:prstGeom prst="roundRect">
-            <a:avLst/>
-          </a:prstGeom>
-          <a:noFill/>
-          <a:ln>
-            <a:solidFill>
-              <a:schemeClr val="tx1"/>
-            </a:solidFill>
-          </a:ln>
-        </p:spPr>
-        <p:style>
-          <a:lnRef idx="2">
-            <a:schemeClr val="accent1">
-              <a:shade val="50000"/>
-            </a:schemeClr>
-          </a:lnRef>
-          <a:fillRef idx="1">
-            <a:schemeClr val="accent1"/>
-          </a:fillRef>
-          <a:effectRef idx="0">
-            <a:schemeClr val="accent1"/>
-          </a:effectRef>
-          <a:fontRef idx="minor">
-            <a:schemeClr val="lt1"/>
-          </a:fontRef>
-        </p:style>
-        <p:txBody>
-          <a:bodyPr rtlCol="0" anchor="ctr"/>
-          <a:lstStyle/>
-          <a:p>
-            <a:pPr algn="ctr"/>
-            <a:r>
-              <a:rPr kumimoji="1" lang="en-US" altLang="ko-KR" sz="1600" dirty="0" smtClean="0">
-                <a:solidFill>
-                  <a:schemeClr val="tx1"/>
-                </a:solidFill>
-              </a:rPr>
-              <a:t>Has Bronchitis</a:t>
-            </a:r>
-            <a:endParaRPr kumimoji="1" lang="ko-KR" altLang="en-US" sz="1600" dirty="0">
-              <a:solidFill>
-                <a:schemeClr val="tx1"/>
-              </a:solidFill>
-            </a:endParaRPr>
-          </a:p>
-        </p:txBody>
-      </p:sp>
-      <p:sp>
-        <p:nvSpPr>
-          <p:cNvPr id="24" name="모서리가 둥근 직사각형 23"/>
-          <p:cNvSpPr/>
-          <p:nvPr/>
-        </p:nvSpPr>
-        <p:spPr>
-          <a:xfrm>
-            <a:off x="4427984" y="4690616"/>
-            <a:ext cx="1656184" cy="648072"/>
-          </a:xfrm>
-          <a:prstGeom prst="roundRect">
-            <a:avLst/>
-          </a:prstGeom>
-          <a:noFill/>
-          <a:ln>
-            <a:solidFill>
-              <a:schemeClr val="tx1"/>
-            </a:solidFill>
-          </a:ln>
-        </p:spPr>
-        <p:style>
-          <a:lnRef idx="2">
-            <a:schemeClr val="accent1">
-              <a:shade val="50000"/>
-            </a:schemeClr>
-          </a:lnRef>
-          <a:fillRef idx="1">
-            <a:schemeClr val="accent1"/>
-          </a:fillRef>
-          <a:effectRef idx="0">
-            <a:schemeClr val="accent1"/>
-          </a:effectRef>
-          <a:fontRef idx="minor">
-            <a:schemeClr val="lt1"/>
-          </a:fontRef>
-        </p:style>
-        <p:txBody>
-          <a:bodyPr rtlCol="0" anchor="ctr"/>
-          <a:lstStyle/>
-          <a:p>
-            <a:pPr algn="ctr"/>
-            <a:r>
-              <a:rPr kumimoji="1" lang="en-US" altLang="ko-KR" sz="1600" smtClean="0">
-                <a:solidFill>
-                  <a:schemeClr val="tx1"/>
-                </a:solidFill>
-              </a:rPr>
-              <a:t>Tuberculosis or Cancer</a:t>
-            </a:r>
-            <a:endParaRPr kumimoji="1" lang="ko-KR" altLang="en-US" sz="1600" dirty="0">
-              <a:solidFill>
-                <a:schemeClr val="tx1"/>
-              </a:solidFill>
-            </a:endParaRPr>
-          </a:p>
-        </p:txBody>
-      </p:sp>
-      <p:sp>
-        <p:nvSpPr>
-          <p:cNvPr id="25" name="모서리가 둥근 직사각형 24"/>
-          <p:cNvSpPr/>
-          <p:nvPr/>
-        </p:nvSpPr>
-        <p:spPr>
-          <a:xfrm>
-            <a:off x="2339752" y="5587793"/>
-            <a:ext cx="1656184" cy="648072"/>
-          </a:xfrm>
-          <a:prstGeom prst="roundRect">
-            <a:avLst/>
-          </a:prstGeom>
-          <a:noFill/>
-          <a:ln>
-            <a:solidFill>
-              <a:schemeClr val="tx1"/>
-            </a:solidFill>
-          </a:ln>
-        </p:spPr>
-        <p:style>
-          <a:lnRef idx="2">
-            <a:schemeClr val="accent1">
-              <a:shade val="50000"/>
-            </a:schemeClr>
-          </a:lnRef>
-          <a:fillRef idx="1">
-            <a:schemeClr val="accent1"/>
-          </a:fillRef>
-          <a:effectRef idx="0">
-            <a:schemeClr val="accent1"/>
-          </a:effectRef>
-          <a:fontRef idx="minor">
-            <a:schemeClr val="lt1"/>
-          </a:fontRef>
-        </p:style>
-        <p:txBody>
-          <a:bodyPr rtlCol="0" anchor="ctr"/>
-          <a:lstStyle/>
-          <a:p>
-            <a:pPr algn="ctr"/>
-            <a:r>
-              <a:rPr kumimoji="1" lang="en-US" altLang="ko-KR" sz="1600" dirty="0" err="1" smtClean="0">
-                <a:solidFill>
-                  <a:schemeClr val="tx1"/>
-                </a:solidFill>
-              </a:rPr>
-              <a:t>Xray</a:t>
-            </a:r>
-            <a:r>
-              <a:rPr kumimoji="1" lang="en-US" altLang="ko-KR" sz="1600" dirty="0" smtClean="0">
-                <a:solidFill>
-                  <a:schemeClr val="tx1"/>
-                </a:solidFill>
-              </a:rPr>
-              <a:t> Result</a:t>
-            </a:r>
-            <a:endParaRPr kumimoji="1" lang="ko-KR" altLang="en-US" sz="1600" dirty="0">
-              <a:solidFill>
-                <a:schemeClr val="tx1"/>
-              </a:solidFill>
-            </a:endParaRPr>
-          </a:p>
-        </p:txBody>
-      </p:sp>
-      <p:sp>
-        <p:nvSpPr>
-          <p:cNvPr id="26" name="모서리가 둥근 직사각형 25"/>
-          <p:cNvSpPr/>
-          <p:nvPr/>
-        </p:nvSpPr>
-        <p:spPr>
-          <a:xfrm>
-            <a:off x="6560537" y="5610308"/>
-            <a:ext cx="1656184" cy="648072"/>
-          </a:xfrm>
-          <a:prstGeom prst="roundRect">
-            <a:avLst/>
-          </a:prstGeom>
-          <a:noFill/>
-          <a:ln>
-            <a:solidFill>
-              <a:schemeClr val="tx1"/>
-            </a:solidFill>
-          </a:ln>
-        </p:spPr>
-        <p:style>
-          <a:lnRef idx="2">
-            <a:schemeClr val="accent1">
-              <a:shade val="50000"/>
-            </a:schemeClr>
-          </a:lnRef>
-          <a:fillRef idx="1">
-            <a:schemeClr val="accent1"/>
-          </a:fillRef>
-          <a:effectRef idx="0">
-            <a:schemeClr val="accent1"/>
-          </a:effectRef>
-          <a:fontRef idx="minor">
-            <a:schemeClr val="lt1"/>
-          </a:fontRef>
-        </p:style>
-        <p:txBody>
-          <a:bodyPr rtlCol="0" anchor="ctr"/>
-          <a:lstStyle/>
-          <a:p>
-            <a:pPr algn="ctr"/>
-            <a:r>
-              <a:rPr kumimoji="1" lang="en-US" altLang="ko-KR" sz="1600" dirty="0" smtClean="0">
-                <a:solidFill>
-                  <a:schemeClr val="tx1"/>
-                </a:solidFill>
-              </a:rPr>
-              <a:t>Dyspnea</a:t>
-            </a:r>
-            <a:endParaRPr kumimoji="1" lang="ko-KR" altLang="en-US" sz="1600" dirty="0">
-              <a:solidFill>
-                <a:schemeClr val="tx1"/>
-              </a:solidFill>
-            </a:endParaRPr>
-          </a:p>
-        </p:txBody>
-      </p:sp>
-      <p:cxnSp>
-        <p:nvCxnSpPr>
-          <p:cNvPr id="27" name="직선 화살표 연결선 26"/>
-          <p:cNvCxnSpPr/>
-          <p:nvPr/>
-        </p:nvCxnSpPr>
-        <p:spPr>
-          <a:xfrm>
-            <a:off x="6560537" y="3318001"/>
-            <a:ext cx="452131" cy="304582"/>
-          </a:xfrm>
-          <a:prstGeom prst="straightConnector1">
-            <a:avLst/>
-          </a:prstGeom>
-          <a:ln>
-            <a:solidFill>
-              <a:schemeClr val="tx1"/>
-            </a:solidFill>
-            <a:tailEnd type="triangle"/>
-          </a:ln>
-        </p:spPr>
-        <p:style>
-          <a:lnRef idx="1">
-            <a:schemeClr val="accent1"/>
-          </a:lnRef>
-          <a:fillRef idx="0">
-            <a:schemeClr val="accent1"/>
-          </a:fillRef>
-          <a:effectRef idx="0">
-            <a:schemeClr val="accent1"/>
-          </a:effectRef>
-          <a:fontRef idx="minor">
-            <a:schemeClr val="tx1"/>
-          </a:fontRef>
-        </p:style>
-      </p:cxnSp>
-      <p:cxnSp>
-        <p:nvCxnSpPr>
-          <p:cNvPr id="28" name="직선 화살표 연결선 27"/>
-          <p:cNvCxnSpPr>
-            <a:endCxn id="22" idx="0"/>
-          </p:cNvCxnSpPr>
-          <p:nvPr/>
-        </p:nvCxnSpPr>
-        <p:spPr>
-          <a:xfrm flipH="1">
-            <a:off x="5254564" y="3318001"/>
-            <a:ext cx="472276" cy="304582"/>
-          </a:xfrm>
-          <a:prstGeom prst="straightConnector1">
-            <a:avLst/>
-          </a:prstGeom>
-          <a:ln>
-            <a:solidFill>
-              <a:schemeClr val="tx1"/>
-            </a:solidFill>
-            <a:tailEnd type="triangle"/>
-          </a:ln>
-        </p:spPr>
-        <p:style>
-          <a:lnRef idx="1">
-            <a:schemeClr val="accent1"/>
-          </a:lnRef>
-          <a:fillRef idx="0">
-            <a:schemeClr val="accent1"/>
-          </a:fillRef>
-          <a:effectRef idx="0">
-            <a:schemeClr val="accent1"/>
-          </a:effectRef>
-          <a:fontRef idx="minor">
-            <a:schemeClr val="tx1"/>
-          </a:fontRef>
-        </p:style>
-      </p:cxnSp>
-      <p:cxnSp>
-        <p:nvCxnSpPr>
-          <p:cNvPr id="29" name="직선 화살표 연결선 28"/>
-          <p:cNvCxnSpPr/>
-          <p:nvPr/>
-        </p:nvCxnSpPr>
-        <p:spPr>
-          <a:xfrm>
-            <a:off x="5228767" y="4270655"/>
-            <a:ext cx="534" cy="419961"/>
-          </a:xfrm>
-          <a:prstGeom prst="straightConnector1">
-            <a:avLst/>
-          </a:prstGeom>
-          <a:ln>
-            <a:solidFill>
-              <a:schemeClr val="tx1"/>
-            </a:solidFill>
-            <a:tailEnd type="triangle"/>
-          </a:ln>
-        </p:spPr>
-        <p:style>
-          <a:lnRef idx="1">
-            <a:schemeClr val="accent1"/>
-          </a:lnRef>
-          <a:fillRef idx="0">
-            <a:schemeClr val="accent1"/>
-          </a:fillRef>
-          <a:effectRef idx="0">
-            <a:schemeClr val="accent1"/>
-          </a:effectRef>
-          <a:fontRef idx="minor">
-            <a:schemeClr val="tx1"/>
-          </a:fontRef>
-        </p:style>
-      </p:cxnSp>
-      <p:cxnSp>
-        <p:nvCxnSpPr>
-          <p:cNvPr id="30" name="직선 화살표 연결선 29"/>
-          <p:cNvCxnSpPr/>
-          <p:nvPr/>
-        </p:nvCxnSpPr>
-        <p:spPr>
-          <a:xfrm>
-            <a:off x="3770340" y="4270654"/>
-            <a:ext cx="841745" cy="419962"/>
-          </a:xfrm>
-          <a:prstGeom prst="straightConnector1">
-            <a:avLst/>
-          </a:prstGeom>
-          <a:ln>
-            <a:solidFill>
-              <a:schemeClr val="tx1"/>
-            </a:solidFill>
-            <a:tailEnd type="triangle"/>
-          </a:ln>
-        </p:spPr>
-        <p:style>
-          <a:lnRef idx="1">
-            <a:schemeClr val="accent1"/>
-          </a:lnRef>
-          <a:fillRef idx="0">
-            <a:schemeClr val="accent1"/>
-          </a:fillRef>
-          <a:effectRef idx="0">
-            <a:schemeClr val="accent1"/>
-          </a:effectRef>
-          <a:fontRef idx="minor">
-            <a:schemeClr val="tx1"/>
-          </a:fontRef>
-        </p:style>
-      </p:cxnSp>
-      <p:cxnSp>
-        <p:nvCxnSpPr>
-          <p:cNvPr id="31" name="직선 화살표 연결선 30"/>
-          <p:cNvCxnSpPr/>
-          <p:nvPr/>
-        </p:nvCxnSpPr>
-        <p:spPr>
-          <a:xfrm flipH="1">
-            <a:off x="3851920" y="5338688"/>
-            <a:ext cx="749993" cy="249105"/>
-          </a:xfrm>
-          <a:prstGeom prst="straightConnector1">
-            <a:avLst/>
-          </a:prstGeom>
-          <a:ln>
-            <a:solidFill>
-              <a:schemeClr val="tx1"/>
-            </a:solidFill>
-            <a:tailEnd type="triangle"/>
-          </a:ln>
-        </p:spPr>
-        <p:style>
-          <a:lnRef idx="1">
-            <a:schemeClr val="accent1"/>
-          </a:lnRef>
-          <a:fillRef idx="0">
-            <a:schemeClr val="accent1"/>
-          </a:fillRef>
-          <a:effectRef idx="0">
-            <a:schemeClr val="accent1"/>
-          </a:effectRef>
-          <a:fontRef idx="minor">
-            <a:schemeClr val="tx1"/>
-          </a:fontRef>
-        </p:style>
-      </p:cxnSp>
-      <p:cxnSp>
-        <p:nvCxnSpPr>
-          <p:cNvPr id="32" name="직선 화살표 연결선 31"/>
-          <p:cNvCxnSpPr/>
-          <p:nvPr/>
-        </p:nvCxnSpPr>
-        <p:spPr>
-          <a:xfrm>
-            <a:off x="6012160" y="5329460"/>
-            <a:ext cx="648072" cy="276790"/>
-          </a:xfrm>
-          <a:prstGeom prst="straightConnector1">
-            <a:avLst/>
-          </a:prstGeom>
-          <a:ln>
-            <a:solidFill>
-              <a:schemeClr val="tx1"/>
-            </a:solidFill>
-            <a:tailEnd type="triangle"/>
-          </a:ln>
-        </p:spPr>
-        <p:style>
-          <a:lnRef idx="1">
-            <a:schemeClr val="accent1"/>
-          </a:lnRef>
-          <a:fillRef idx="0">
-            <a:schemeClr val="accent1"/>
-          </a:fillRef>
-          <a:effectRef idx="0">
-            <a:schemeClr val="accent1"/>
-          </a:effectRef>
-          <a:fontRef idx="minor">
-            <a:schemeClr val="tx1"/>
-          </a:fontRef>
-        </p:style>
-      </p:cxnSp>
-      <p:cxnSp>
-        <p:nvCxnSpPr>
-          <p:cNvPr id="33" name="직선 화살표 연결선 32"/>
-          <p:cNvCxnSpPr>
-            <a:endCxn id="26" idx="0"/>
-          </p:cNvCxnSpPr>
-          <p:nvPr/>
-        </p:nvCxnSpPr>
-        <p:spPr>
-          <a:xfrm>
-            <a:off x="7368290" y="4270655"/>
-            <a:ext cx="20339" cy="1339653"/>
-          </a:xfrm>
-          <a:prstGeom prst="straightConnector1">
-            <a:avLst/>
-          </a:prstGeom>
-          <a:ln>
-            <a:solidFill>
-              <a:schemeClr val="tx1"/>
-            </a:solidFill>
-            <a:tailEnd type="triangle"/>
-          </a:ln>
-        </p:spPr>
-        <p:style>
-          <a:lnRef idx="1">
-            <a:schemeClr val="accent1"/>
-          </a:lnRef>
-          <a:fillRef idx="0">
-            <a:schemeClr val="accent1"/>
-          </a:fillRef>
-          <a:effectRef idx="0">
-            <a:schemeClr val="accent1"/>
-          </a:effectRef>
-          <a:fontRef idx="minor">
-            <a:schemeClr val="tx1"/>
-          </a:fontRef>
-        </p:style>
-      </p:cxnSp>
+      </p:pic>
     </p:spTree>
     <p:extLst>
       <p:ext uri="{BB962C8B-B14F-4D97-AF65-F5344CB8AC3E}">
-        <p14:creationId xmlns:p14="http://schemas.microsoft.com/office/powerpoint/2010/main" val="980669777"/>
+        <p14:creationId xmlns:p14="http://schemas.microsoft.com/office/powerpoint/2010/main" val="2123450789"/>
       </p:ext>
     </p:extLst>
   </p:cSld>
@@ -7929,787 +6725,70 @@
           <a:lstStyle/>
           <a:p>
             <a:r>
-              <a:rPr lang="en-US" altLang="ko-KR" dirty="0" smtClean="0"/>
-              <a:t>Data size = 15,000 and 30,000</a:t>
+              <a:rPr lang="ko-KR" altLang="en-US" dirty="0" smtClean="0"/>
+              <a:t>결과</a:t>
+            </a:r>
+            <a:endParaRPr lang="en-US" altLang="ko-KR" dirty="0" smtClean="0"/>
+          </a:p>
+          <a:p>
+            <a:pPr lvl="1"/>
+            <a:r>
+              <a:rPr lang="en-US" altLang="ko-KR" dirty="0" smtClean="0"/>
+              <a:t>Data Size = 15,000 / 30,000</a:t>
+            </a:r>
+          </a:p>
+          <a:p>
+            <a:pPr lvl="1"/>
+            <a:r>
+              <a:rPr lang="en-US" altLang="ko-KR" dirty="0" err="1" smtClean="0"/>
+              <a:t>LogScore</a:t>
+            </a:r>
+            <a:r>
+              <a:rPr lang="en-US" altLang="ko-KR" dirty="0" smtClean="0"/>
+              <a:t> BAYES : </a:t>
+            </a:r>
+            <a:r>
+              <a:rPr lang="fi-FI" altLang="ko-KR" dirty="0"/>
+              <a:t>-</a:t>
+            </a:r>
+            <a:r>
+              <a:rPr lang="fi-FI" altLang="ko-KR" dirty="0" smtClean="0"/>
+              <a:t>72956.7918</a:t>
             </a:r>
             <a:endParaRPr lang="ko-KR" altLang="en-US" dirty="0"/>
           </a:p>
         </p:txBody>
       </p:sp>
-      <p:sp>
-        <p:nvSpPr>
-          <p:cNvPr id="4" name="모서리가 둥근 직사각형 3"/>
-          <p:cNvSpPr/>
+      <p:pic>
+        <p:nvPicPr>
+          <p:cNvPr id="21" name="그림 20"/>
+          <p:cNvPicPr>
+            <a:picLocks noChangeAspect="1"/>
+          </p:cNvPicPr>
           <p:nvPr/>
-        </p:nvSpPr>
+        </p:nvPicPr>
+        <p:blipFill>
+          <a:blip r:embed="rId2">
+            <a:extLst>
+              <a:ext uri="{28A0092B-C50C-407E-A947-70E740481C1C}">
+                <a14:useLocalDpi xmlns:a14="http://schemas.microsoft.com/office/drawing/2010/main" val="0"/>
+              </a:ext>
+            </a:extLst>
+          </a:blip>
+          <a:stretch>
+            <a:fillRect/>
+          </a:stretch>
+        </p:blipFill>
         <p:spPr>
           <a:xfrm>
-            <a:off x="2565005" y="2522214"/>
-            <a:ext cx="1656184" cy="648072"/>
+            <a:off x="4521894" y="3387197"/>
+            <a:ext cx="4225273" cy="2937403"/>
           </a:xfrm>
-          <a:prstGeom prst="roundRect">
+          <a:prstGeom prst="rect">
             <a:avLst/>
           </a:prstGeom>
-          <a:noFill/>
-          <a:ln>
-            <a:solidFill>
-              <a:schemeClr val="tx1"/>
-            </a:solidFill>
-          </a:ln>
         </p:spPr>
-        <p:style>
-          <a:lnRef idx="2">
-            <a:schemeClr val="accent1">
-              <a:shade val="50000"/>
-            </a:schemeClr>
-          </a:lnRef>
-          <a:fillRef idx="1">
-            <a:schemeClr val="accent1"/>
-          </a:fillRef>
-          <a:effectRef idx="0">
-            <a:schemeClr val="accent1"/>
-          </a:effectRef>
-          <a:fontRef idx="minor">
-            <a:schemeClr val="lt1"/>
-          </a:fontRef>
-        </p:style>
-        <p:txBody>
-          <a:bodyPr rtlCol="0" anchor="ctr"/>
-          <a:lstStyle/>
-          <a:p>
-            <a:pPr algn="ctr"/>
-            <a:r>
-              <a:rPr kumimoji="1" lang="en-US" altLang="ko-KR" sz="1600" dirty="0" smtClean="0">
-                <a:solidFill>
-                  <a:schemeClr val="tx1"/>
-                </a:solidFill>
-              </a:rPr>
-              <a:t>Visit to Asia</a:t>
-            </a:r>
-            <a:endParaRPr kumimoji="1" lang="ko-KR" altLang="en-US" sz="1600" dirty="0">
-              <a:solidFill>
-                <a:schemeClr val="tx1"/>
-              </a:solidFill>
-            </a:endParaRPr>
-          </a:p>
-        </p:txBody>
-      </p:sp>
-      <p:sp>
-        <p:nvSpPr>
-          <p:cNvPr id="5" name="모서리가 둥근 직사각형 4"/>
-          <p:cNvSpPr/>
-          <p:nvPr/>
-        </p:nvSpPr>
-        <p:spPr>
-          <a:xfrm>
-            <a:off x="5581737" y="2538076"/>
-            <a:ext cx="1656184" cy="699755"/>
-          </a:xfrm>
-          <a:prstGeom prst="roundRect">
-            <a:avLst/>
-          </a:prstGeom>
-          <a:noFill/>
-          <a:ln>
-            <a:solidFill>
-              <a:schemeClr val="tx1"/>
-            </a:solidFill>
-          </a:ln>
-        </p:spPr>
-        <p:style>
-          <a:lnRef idx="2">
-            <a:schemeClr val="accent1">
-              <a:shade val="50000"/>
-            </a:schemeClr>
-          </a:lnRef>
-          <a:fillRef idx="1">
-            <a:schemeClr val="accent1"/>
-          </a:fillRef>
-          <a:effectRef idx="0">
-            <a:schemeClr val="accent1"/>
-          </a:effectRef>
-          <a:fontRef idx="minor">
-            <a:schemeClr val="lt1"/>
-          </a:fontRef>
-        </p:style>
-        <p:txBody>
-          <a:bodyPr rtlCol="0" anchor="ctr"/>
-          <a:lstStyle/>
-          <a:p>
-            <a:pPr algn="ctr"/>
-            <a:r>
-              <a:rPr kumimoji="1" lang="en-US" altLang="ko-KR" sz="1600" smtClean="0">
-                <a:solidFill>
-                  <a:schemeClr val="tx1"/>
-                </a:solidFill>
-              </a:rPr>
-              <a:t>Smoker</a:t>
-            </a:r>
-            <a:endParaRPr kumimoji="1" lang="ko-KR" altLang="en-US" sz="1600" dirty="0">
-              <a:solidFill>
-                <a:schemeClr val="tx1"/>
-              </a:solidFill>
-            </a:endParaRPr>
-          </a:p>
-        </p:txBody>
-      </p:sp>
-      <p:sp>
-        <p:nvSpPr>
-          <p:cNvPr id="6" name="모서리가 둥근 직사각형 5"/>
-          <p:cNvSpPr/>
-          <p:nvPr/>
-        </p:nvSpPr>
-        <p:spPr>
-          <a:xfrm>
-            <a:off x="2565005" y="3542413"/>
-            <a:ext cx="1656184" cy="648072"/>
-          </a:xfrm>
-          <a:prstGeom prst="roundRect">
-            <a:avLst/>
-          </a:prstGeom>
-          <a:noFill/>
-          <a:ln>
-            <a:solidFill>
-              <a:schemeClr val="tx1"/>
-            </a:solidFill>
-          </a:ln>
-        </p:spPr>
-        <p:style>
-          <a:lnRef idx="2">
-            <a:schemeClr val="accent1">
-              <a:shade val="50000"/>
-            </a:schemeClr>
-          </a:lnRef>
-          <a:fillRef idx="1">
-            <a:schemeClr val="accent1"/>
-          </a:fillRef>
-          <a:effectRef idx="0">
-            <a:schemeClr val="accent1"/>
-          </a:effectRef>
-          <a:fontRef idx="minor">
-            <a:schemeClr val="lt1"/>
-          </a:fontRef>
-        </p:style>
-        <p:txBody>
-          <a:bodyPr rtlCol="0" anchor="ctr"/>
-          <a:lstStyle/>
-          <a:p>
-            <a:pPr algn="ctr"/>
-            <a:r>
-              <a:rPr kumimoji="1" lang="en-US" altLang="ko-KR" sz="1600" dirty="0" smtClean="0">
-                <a:solidFill>
-                  <a:schemeClr val="tx1"/>
-                </a:solidFill>
-              </a:rPr>
-              <a:t>Has </a:t>
-            </a:r>
-            <a:r>
-              <a:rPr kumimoji="1" lang="en-US" altLang="ko-KR" sz="1600" dirty="0" err="1" smtClean="0">
-                <a:solidFill>
-                  <a:schemeClr val="tx1"/>
-                </a:solidFill>
-              </a:rPr>
-              <a:t>Turberculosis</a:t>
-            </a:r>
-            <a:endParaRPr kumimoji="1" lang="ko-KR" altLang="en-US" sz="1600" dirty="0">
-              <a:solidFill>
-                <a:schemeClr val="tx1"/>
-              </a:solidFill>
-            </a:endParaRPr>
-          </a:p>
-        </p:txBody>
-      </p:sp>
-      <p:sp>
-        <p:nvSpPr>
-          <p:cNvPr id="7" name="모서리가 둥근 직사각형 6"/>
-          <p:cNvSpPr/>
-          <p:nvPr/>
-        </p:nvSpPr>
-        <p:spPr>
-          <a:xfrm>
-            <a:off x="4651725" y="3542413"/>
-            <a:ext cx="1656184" cy="648072"/>
-          </a:xfrm>
-          <a:prstGeom prst="roundRect">
-            <a:avLst/>
-          </a:prstGeom>
-          <a:noFill/>
-          <a:ln>
-            <a:solidFill>
-              <a:schemeClr val="tx1"/>
-            </a:solidFill>
-          </a:ln>
-        </p:spPr>
-        <p:style>
-          <a:lnRef idx="2">
-            <a:schemeClr val="accent1">
-              <a:shade val="50000"/>
-            </a:schemeClr>
-          </a:lnRef>
-          <a:fillRef idx="1">
-            <a:schemeClr val="accent1"/>
-          </a:fillRef>
-          <a:effectRef idx="0">
-            <a:schemeClr val="accent1"/>
-          </a:effectRef>
-          <a:fontRef idx="minor">
-            <a:schemeClr val="lt1"/>
-          </a:fontRef>
-        </p:style>
-        <p:txBody>
-          <a:bodyPr rtlCol="0" anchor="ctr"/>
-          <a:lstStyle/>
-          <a:p>
-            <a:pPr algn="ctr"/>
-            <a:r>
-              <a:rPr kumimoji="1" lang="en-US" altLang="ko-KR" sz="1600" dirty="0" smtClean="0">
-                <a:solidFill>
-                  <a:schemeClr val="tx1"/>
-                </a:solidFill>
-              </a:rPr>
-              <a:t>Has Lung Cancer</a:t>
-            </a:r>
-            <a:endParaRPr kumimoji="1" lang="ko-KR" altLang="en-US" sz="1600" dirty="0">
-              <a:solidFill>
-                <a:schemeClr val="tx1"/>
-              </a:solidFill>
-            </a:endParaRPr>
-          </a:p>
-        </p:txBody>
-      </p:sp>
-      <p:sp>
-        <p:nvSpPr>
-          <p:cNvPr id="8" name="모서리가 둥근 직사각형 7"/>
-          <p:cNvSpPr/>
-          <p:nvPr/>
-        </p:nvSpPr>
-        <p:spPr>
-          <a:xfrm>
-            <a:off x="6785790" y="3542413"/>
-            <a:ext cx="1656184" cy="648072"/>
-          </a:xfrm>
-          <a:prstGeom prst="roundRect">
-            <a:avLst/>
-          </a:prstGeom>
-          <a:noFill/>
-          <a:ln>
-            <a:solidFill>
-              <a:schemeClr val="tx1"/>
-            </a:solidFill>
-          </a:ln>
-        </p:spPr>
-        <p:style>
-          <a:lnRef idx="2">
-            <a:schemeClr val="accent1">
-              <a:shade val="50000"/>
-            </a:schemeClr>
-          </a:lnRef>
-          <a:fillRef idx="1">
-            <a:schemeClr val="accent1"/>
-          </a:fillRef>
-          <a:effectRef idx="0">
-            <a:schemeClr val="accent1"/>
-          </a:effectRef>
-          <a:fontRef idx="minor">
-            <a:schemeClr val="lt1"/>
-          </a:fontRef>
-        </p:style>
-        <p:txBody>
-          <a:bodyPr rtlCol="0" anchor="ctr"/>
-          <a:lstStyle/>
-          <a:p>
-            <a:pPr algn="ctr"/>
-            <a:r>
-              <a:rPr kumimoji="1" lang="en-US" altLang="ko-KR" sz="1600" dirty="0" smtClean="0">
-                <a:solidFill>
-                  <a:schemeClr val="tx1"/>
-                </a:solidFill>
-              </a:rPr>
-              <a:t>Has Bronchitis</a:t>
-            </a:r>
-            <a:endParaRPr kumimoji="1" lang="ko-KR" altLang="en-US" sz="1600" dirty="0">
-              <a:solidFill>
-                <a:schemeClr val="tx1"/>
-              </a:solidFill>
-            </a:endParaRPr>
-          </a:p>
-        </p:txBody>
-      </p:sp>
-      <p:sp>
-        <p:nvSpPr>
-          <p:cNvPr id="9" name="모서리가 둥근 직사각형 8"/>
-          <p:cNvSpPr/>
-          <p:nvPr/>
-        </p:nvSpPr>
-        <p:spPr>
-          <a:xfrm>
-            <a:off x="4653237" y="4610446"/>
-            <a:ext cx="1656184" cy="648072"/>
-          </a:xfrm>
-          <a:prstGeom prst="roundRect">
-            <a:avLst/>
-          </a:prstGeom>
-          <a:noFill/>
-          <a:ln>
-            <a:solidFill>
-              <a:schemeClr val="tx1"/>
-            </a:solidFill>
-          </a:ln>
-        </p:spPr>
-        <p:style>
-          <a:lnRef idx="2">
-            <a:schemeClr val="accent1">
-              <a:shade val="50000"/>
-            </a:schemeClr>
-          </a:lnRef>
-          <a:fillRef idx="1">
-            <a:schemeClr val="accent1"/>
-          </a:fillRef>
-          <a:effectRef idx="0">
-            <a:schemeClr val="accent1"/>
-          </a:effectRef>
-          <a:fontRef idx="minor">
-            <a:schemeClr val="lt1"/>
-          </a:fontRef>
-        </p:style>
-        <p:txBody>
-          <a:bodyPr rtlCol="0" anchor="ctr"/>
-          <a:lstStyle/>
-          <a:p>
-            <a:pPr algn="ctr"/>
-            <a:r>
-              <a:rPr kumimoji="1" lang="en-US" altLang="ko-KR" sz="1600" smtClean="0">
-                <a:solidFill>
-                  <a:schemeClr val="tx1"/>
-                </a:solidFill>
-              </a:rPr>
-              <a:t>Tuberculosis or Cancer</a:t>
-            </a:r>
-            <a:endParaRPr kumimoji="1" lang="ko-KR" altLang="en-US" sz="1600" dirty="0">
-              <a:solidFill>
-                <a:schemeClr val="tx1"/>
-              </a:solidFill>
-            </a:endParaRPr>
-          </a:p>
-        </p:txBody>
-      </p:sp>
-      <p:sp>
-        <p:nvSpPr>
-          <p:cNvPr id="10" name="모서리가 둥근 직사각형 9"/>
-          <p:cNvSpPr/>
-          <p:nvPr/>
-        </p:nvSpPr>
-        <p:spPr>
-          <a:xfrm>
-            <a:off x="2565005" y="5507623"/>
-            <a:ext cx="1656184" cy="648072"/>
-          </a:xfrm>
-          <a:prstGeom prst="roundRect">
-            <a:avLst/>
-          </a:prstGeom>
-          <a:noFill/>
-          <a:ln>
-            <a:solidFill>
-              <a:schemeClr val="tx1"/>
-            </a:solidFill>
-          </a:ln>
-        </p:spPr>
-        <p:style>
-          <a:lnRef idx="2">
-            <a:schemeClr val="accent1">
-              <a:shade val="50000"/>
-            </a:schemeClr>
-          </a:lnRef>
-          <a:fillRef idx="1">
-            <a:schemeClr val="accent1"/>
-          </a:fillRef>
-          <a:effectRef idx="0">
-            <a:schemeClr val="accent1"/>
-          </a:effectRef>
-          <a:fontRef idx="minor">
-            <a:schemeClr val="lt1"/>
-          </a:fontRef>
-        </p:style>
-        <p:txBody>
-          <a:bodyPr rtlCol="0" anchor="ctr"/>
-          <a:lstStyle/>
-          <a:p>
-            <a:pPr algn="ctr"/>
-            <a:r>
-              <a:rPr kumimoji="1" lang="en-US" altLang="ko-KR" sz="1600" dirty="0" err="1" smtClean="0">
-                <a:solidFill>
-                  <a:schemeClr val="tx1"/>
-                </a:solidFill>
-              </a:rPr>
-              <a:t>Xray</a:t>
-            </a:r>
-            <a:r>
-              <a:rPr kumimoji="1" lang="en-US" altLang="ko-KR" sz="1600" dirty="0" smtClean="0">
-                <a:solidFill>
-                  <a:schemeClr val="tx1"/>
-                </a:solidFill>
-              </a:rPr>
-              <a:t> Result</a:t>
-            </a:r>
-            <a:endParaRPr kumimoji="1" lang="ko-KR" altLang="en-US" sz="1600" dirty="0">
-              <a:solidFill>
-                <a:schemeClr val="tx1"/>
-              </a:solidFill>
-            </a:endParaRPr>
-          </a:p>
-        </p:txBody>
-      </p:sp>
-      <p:sp>
-        <p:nvSpPr>
-          <p:cNvPr id="11" name="모서리가 둥근 직사각형 10"/>
-          <p:cNvSpPr/>
-          <p:nvPr/>
-        </p:nvSpPr>
-        <p:spPr>
-          <a:xfrm>
-            <a:off x="6785790" y="5530138"/>
-            <a:ext cx="1656184" cy="648072"/>
-          </a:xfrm>
-          <a:prstGeom prst="roundRect">
-            <a:avLst/>
-          </a:prstGeom>
-          <a:noFill/>
-          <a:ln>
-            <a:solidFill>
-              <a:schemeClr val="tx1"/>
-            </a:solidFill>
-          </a:ln>
-        </p:spPr>
-        <p:style>
-          <a:lnRef idx="2">
-            <a:schemeClr val="accent1">
-              <a:shade val="50000"/>
-            </a:schemeClr>
-          </a:lnRef>
-          <a:fillRef idx="1">
-            <a:schemeClr val="accent1"/>
-          </a:fillRef>
-          <a:effectRef idx="0">
-            <a:schemeClr val="accent1"/>
-          </a:effectRef>
-          <a:fontRef idx="minor">
-            <a:schemeClr val="lt1"/>
-          </a:fontRef>
-        </p:style>
-        <p:txBody>
-          <a:bodyPr rtlCol="0" anchor="ctr"/>
-          <a:lstStyle/>
-          <a:p>
-            <a:pPr algn="ctr"/>
-            <a:r>
-              <a:rPr kumimoji="1" lang="en-US" altLang="ko-KR" sz="1600" dirty="0" smtClean="0">
-                <a:solidFill>
-                  <a:schemeClr val="tx1"/>
-                </a:solidFill>
-              </a:rPr>
-              <a:t>Dyspnea</a:t>
-            </a:r>
-            <a:endParaRPr kumimoji="1" lang="ko-KR" altLang="en-US" sz="1600" dirty="0">
-              <a:solidFill>
-                <a:schemeClr val="tx1"/>
-              </a:solidFill>
-            </a:endParaRPr>
-          </a:p>
-        </p:txBody>
-      </p:sp>
-      <p:cxnSp>
-        <p:nvCxnSpPr>
-          <p:cNvPr id="12" name="직선 화살표 연결선 11"/>
-          <p:cNvCxnSpPr/>
-          <p:nvPr/>
-        </p:nvCxnSpPr>
-        <p:spPr>
-          <a:xfrm>
-            <a:off x="6785790" y="3237831"/>
-            <a:ext cx="452131" cy="304582"/>
-          </a:xfrm>
-          <a:prstGeom prst="straightConnector1">
-            <a:avLst/>
-          </a:prstGeom>
-          <a:ln>
-            <a:solidFill>
-              <a:schemeClr val="tx1"/>
-            </a:solidFill>
-            <a:tailEnd type="triangle"/>
-          </a:ln>
-        </p:spPr>
-        <p:style>
-          <a:lnRef idx="1">
-            <a:schemeClr val="accent1"/>
-          </a:lnRef>
-          <a:fillRef idx="0">
-            <a:schemeClr val="accent1"/>
-          </a:fillRef>
-          <a:effectRef idx="0">
-            <a:schemeClr val="accent1"/>
-          </a:effectRef>
-          <a:fontRef idx="minor">
-            <a:schemeClr val="tx1"/>
-          </a:fontRef>
-        </p:style>
-      </p:cxnSp>
-      <p:cxnSp>
-        <p:nvCxnSpPr>
-          <p:cNvPr id="13" name="직선 화살표 연결선 12"/>
-          <p:cNvCxnSpPr>
-            <a:endCxn id="7" idx="0"/>
-          </p:cNvCxnSpPr>
-          <p:nvPr/>
-        </p:nvCxnSpPr>
-        <p:spPr>
-          <a:xfrm flipH="1">
-            <a:off x="5479817" y="3237831"/>
-            <a:ext cx="472276" cy="304582"/>
-          </a:xfrm>
-          <a:prstGeom prst="straightConnector1">
-            <a:avLst/>
-          </a:prstGeom>
-          <a:ln>
-            <a:solidFill>
-              <a:schemeClr val="tx1"/>
-            </a:solidFill>
-            <a:tailEnd type="triangle"/>
-          </a:ln>
-        </p:spPr>
-        <p:style>
-          <a:lnRef idx="1">
-            <a:schemeClr val="accent1"/>
-          </a:lnRef>
-          <a:fillRef idx="0">
-            <a:schemeClr val="accent1"/>
-          </a:fillRef>
-          <a:effectRef idx="0">
-            <a:schemeClr val="accent1"/>
-          </a:effectRef>
-          <a:fontRef idx="minor">
-            <a:schemeClr val="tx1"/>
-          </a:fontRef>
-        </p:style>
-      </p:cxnSp>
-      <p:cxnSp>
-        <p:nvCxnSpPr>
-          <p:cNvPr id="14" name="직선 화살표 연결선 13"/>
-          <p:cNvCxnSpPr/>
-          <p:nvPr/>
-        </p:nvCxnSpPr>
-        <p:spPr>
-          <a:xfrm>
-            <a:off x="5454020" y="4190485"/>
-            <a:ext cx="534" cy="419961"/>
-          </a:xfrm>
-          <a:prstGeom prst="straightConnector1">
-            <a:avLst/>
-          </a:prstGeom>
-          <a:ln>
-            <a:solidFill>
-              <a:schemeClr val="tx1"/>
-            </a:solidFill>
-            <a:tailEnd type="triangle"/>
-          </a:ln>
-        </p:spPr>
-        <p:style>
-          <a:lnRef idx="1">
-            <a:schemeClr val="accent1"/>
-          </a:lnRef>
-          <a:fillRef idx="0">
-            <a:schemeClr val="accent1"/>
-          </a:fillRef>
-          <a:effectRef idx="0">
-            <a:schemeClr val="accent1"/>
-          </a:effectRef>
-          <a:fontRef idx="minor">
-            <a:schemeClr val="tx1"/>
-          </a:fontRef>
-        </p:style>
-      </p:cxnSp>
-      <p:cxnSp>
-        <p:nvCxnSpPr>
-          <p:cNvPr id="15" name="직선 화살표 연결선 14"/>
-          <p:cNvCxnSpPr/>
-          <p:nvPr/>
-        </p:nvCxnSpPr>
-        <p:spPr>
-          <a:xfrm>
-            <a:off x="3995593" y="4190484"/>
-            <a:ext cx="841745" cy="419962"/>
-          </a:xfrm>
-          <a:prstGeom prst="straightConnector1">
-            <a:avLst/>
-          </a:prstGeom>
-          <a:ln>
-            <a:solidFill>
-              <a:schemeClr val="tx1"/>
-            </a:solidFill>
-            <a:tailEnd type="triangle"/>
-          </a:ln>
-        </p:spPr>
-        <p:style>
-          <a:lnRef idx="1">
-            <a:schemeClr val="accent1"/>
-          </a:lnRef>
-          <a:fillRef idx="0">
-            <a:schemeClr val="accent1"/>
-          </a:fillRef>
-          <a:effectRef idx="0">
-            <a:schemeClr val="accent1"/>
-          </a:effectRef>
-          <a:fontRef idx="minor">
-            <a:schemeClr val="tx1"/>
-          </a:fontRef>
-        </p:style>
-      </p:cxnSp>
-      <p:cxnSp>
-        <p:nvCxnSpPr>
-          <p:cNvPr id="16" name="직선 화살표 연결선 15"/>
-          <p:cNvCxnSpPr/>
-          <p:nvPr/>
-        </p:nvCxnSpPr>
-        <p:spPr>
-          <a:xfrm flipH="1">
-            <a:off x="4077173" y="5258518"/>
-            <a:ext cx="749993" cy="249105"/>
-          </a:xfrm>
-          <a:prstGeom prst="straightConnector1">
-            <a:avLst/>
-          </a:prstGeom>
-          <a:ln>
-            <a:solidFill>
-              <a:schemeClr val="tx1"/>
-            </a:solidFill>
-            <a:tailEnd type="triangle"/>
-          </a:ln>
-        </p:spPr>
-        <p:style>
-          <a:lnRef idx="1">
-            <a:schemeClr val="accent1"/>
-          </a:lnRef>
-          <a:fillRef idx="0">
-            <a:schemeClr val="accent1"/>
-          </a:fillRef>
-          <a:effectRef idx="0">
-            <a:schemeClr val="accent1"/>
-          </a:effectRef>
-          <a:fontRef idx="minor">
-            <a:schemeClr val="tx1"/>
-          </a:fontRef>
-        </p:style>
-      </p:cxnSp>
-      <p:cxnSp>
-        <p:nvCxnSpPr>
-          <p:cNvPr id="17" name="직선 화살표 연결선 16"/>
-          <p:cNvCxnSpPr/>
-          <p:nvPr/>
-        </p:nvCxnSpPr>
-        <p:spPr>
-          <a:xfrm>
-            <a:off x="6237413" y="5249290"/>
-            <a:ext cx="648072" cy="276790"/>
-          </a:xfrm>
-          <a:prstGeom prst="straightConnector1">
-            <a:avLst/>
-          </a:prstGeom>
-          <a:ln>
-            <a:solidFill>
-              <a:schemeClr val="tx1"/>
-            </a:solidFill>
-            <a:tailEnd type="triangle"/>
-          </a:ln>
-        </p:spPr>
-        <p:style>
-          <a:lnRef idx="1">
-            <a:schemeClr val="accent1"/>
-          </a:lnRef>
-          <a:fillRef idx="0">
-            <a:schemeClr val="accent1"/>
-          </a:fillRef>
-          <a:effectRef idx="0">
-            <a:schemeClr val="accent1"/>
-          </a:effectRef>
-          <a:fontRef idx="minor">
-            <a:schemeClr val="tx1"/>
-          </a:fontRef>
-        </p:style>
-      </p:cxnSp>
-      <p:cxnSp>
-        <p:nvCxnSpPr>
-          <p:cNvPr id="18" name="직선 화살표 연결선 17"/>
-          <p:cNvCxnSpPr>
-            <a:endCxn id="11" idx="0"/>
-          </p:cNvCxnSpPr>
-          <p:nvPr/>
-        </p:nvCxnSpPr>
-        <p:spPr>
-          <a:xfrm>
-            <a:off x="7593543" y="4190485"/>
-            <a:ext cx="20339" cy="1339653"/>
-          </a:xfrm>
-          <a:prstGeom prst="straightConnector1">
-            <a:avLst/>
-          </a:prstGeom>
-          <a:ln>
-            <a:solidFill>
-              <a:schemeClr val="tx1"/>
-            </a:solidFill>
-            <a:tailEnd type="triangle"/>
-          </a:ln>
-        </p:spPr>
-        <p:style>
-          <a:lnRef idx="1">
-            <a:schemeClr val="accent1"/>
-          </a:lnRef>
-          <a:fillRef idx="0">
-            <a:schemeClr val="accent1"/>
-          </a:fillRef>
-          <a:effectRef idx="0">
-            <a:schemeClr val="accent1"/>
-          </a:effectRef>
-          <a:fontRef idx="minor">
-            <a:schemeClr val="tx1"/>
-          </a:fontRef>
-        </p:style>
-      </p:cxnSp>
-      <p:cxnSp>
-        <p:nvCxnSpPr>
-          <p:cNvPr id="19" name="직선 화살표 연결선 18"/>
-          <p:cNvCxnSpPr>
-            <a:endCxn id="6" idx="0"/>
-          </p:cNvCxnSpPr>
-          <p:nvPr/>
-        </p:nvCxnSpPr>
-        <p:spPr>
-          <a:xfrm>
-            <a:off x="3393097" y="3170286"/>
-            <a:ext cx="0" cy="372127"/>
-          </a:xfrm>
-          <a:prstGeom prst="straightConnector1">
-            <a:avLst/>
-          </a:prstGeom>
-          <a:ln>
-            <a:solidFill>
-              <a:schemeClr val="tx1"/>
-            </a:solidFill>
-            <a:tailEnd type="triangle"/>
-          </a:ln>
-        </p:spPr>
-        <p:style>
-          <a:lnRef idx="1">
-            <a:schemeClr val="accent1"/>
-          </a:lnRef>
-          <a:fillRef idx="0">
-            <a:schemeClr val="accent1"/>
-          </a:fillRef>
-          <a:effectRef idx="0">
-            <a:schemeClr val="accent1"/>
-          </a:effectRef>
-          <a:fontRef idx="minor">
-            <a:schemeClr val="tx1"/>
-          </a:fontRef>
-        </p:style>
-      </p:cxnSp>
+      </p:pic>
     </p:spTree>
     <p:extLst>
       <p:ext uri="{BB962C8B-B14F-4D97-AF65-F5344CB8AC3E}">
@@ -8756,13 +6835,14 @@
           <a:lstStyle/>
           <a:p>
             <a:r>
+              <a:rPr lang="en-US" altLang="ko-KR" dirty="0" smtClean="0"/>
+              <a:t>3. </a:t>
+            </a:r>
+            <a:r>
               <a:rPr lang="ko-KR" altLang="en-US" dirty="0" smtClean="0"/>
-              <a:t>참고문</a:t>
-            </a:r>
-            <a:r>
-              <a:rPr lang="ko-KR" altLang="en-US" dirty="0"/>
-              <a:t>헌</a:t>
-            </a:r>
+              <a:t>학습</a:t>
+            </a:r>
+            <a:endParaRPr lang="ko-KR" altLang="en-US" dirty="0"/>
           </a:p>
         </p:txBody>
       </p:sp>
@@ -8781,61 +6861,152 @@
           <a:bodyPr/>
           <a:lstStyle/>
           <a:p>
-            <a:r>
-              <a:rPr lang="en-US" altLang="ko-KR" dirty="0"/>
-              <a:t>Kevin Murphy, </a:t>
-            </a:r>
-            <a:r>
-              <a:rPr lang="en-US" altLang="ko-KR" dirty="0" smtClean="0"/>
-              <a:t>“A </a:t>
-            </a:r>
-            <a:r>
-              <a:rPr lang="en-US" altLang="ko-KR" dirty="0"/>
-              <a:t>Brief Introduction to Graphical Models and Bayesian </a:t>
-            </a:r>
-            <a:r>
-              <a:rPr lang="en-US" altLang="ko-KR" dirty="0" smtClean="0"/>
-              <a:t>Networks”, 1998</a:t>
-            </a:r>
-          </a:p>
-          <a:p>
+            <a:pPr marL="0" marR="0" lvl="0" indent="0" defTabSz="914400" eaLnBrk="1" fontAlgn="auto" latinLnBrk="0" hangingPunct="1">
+              <a:lnSpc>
+                <a:spcPct val="100000"/>
+              </a:lnSpc>
+              <a:spcBef>
+                <a:spcPts val="0"/>
+              </a:spcBef>
+              <a:spcAft>
+                <a:spcPts val="0"/>
+              </a:spcAft>
+              <a:buClrTx/>
+              <a:buSzTx/>
+              <a:buFontTx/>
+              <a:buNone/>
+              <a:tabLst/>
+              <a:defRPr/>
+            </a:pPr>
+            <a:r>
+              <a:rPr lang="en-US" altLang="ko-KR" dirty="0" smtClean="0"/>
+              <a:t>3)</a:t>
+            </a:r>
             <a:r>
               <a:rPr lang="ko-KR" altLang="en-US" dirty="0" smtClean="0"/>
-              <a:t>인공지능</a:t>
-            </a:r>
-            <a:r>
-              <a:rPr lang="en-US" altLang="ko-KR" dirty="0" smtClean="0"/>
-              <a:t>-</a:t>
-            </a:r>
+              <a:t> </a:t>
+            </a:r>
+            <a:r>
+              <a:rPr lang="en-US" altLang="ko-KR" dirty="0" smtClean="0"/>
+              <a:t>Alarm Network</a:t>
+            </a:r>
+          </a:p>
+          <a:p>
+            <a:pPr lvl="1" eaLnBrk="1" fontAlgn="auto" hangingPunct="1">
+              <a:spcBef>
+                <a:spcPts val="0"/>
+              </a:spcBef>
+              <a:spcAft>
+                <a:spcPts val="0"/>
+              </a:spcAft>
+              <a:buClrTx/>
+              <a:buFont typeface="Arial" charset="0"/>
+              <a:buChar char="•"/>
+            </a:pPr>
             <a:r>
               <a:rPr lang="ko-KR" altLang="en-US" dirty="0" smtClean="0"/>
-              <a:t>지능형 에이전트를 중심으로</a:t>
-            </a:r>
-            <a:r>
-              <a:rPr lang="en-US" altLang="ko-KR" dirty="0" smtClean="0"/>
-              <a:t>, Nils J. Nilsson, </a:t>
+              <a:t>노드 수 </a:t>
+            </a:r>
+            <a:r>
+              <a:rPr lang="en-US" altLang="ko-KR" dirty="0" smtClean="0"/>
+              <a:t>:</a:t>
             </a:r>
             <a:r>
               <a:rPr lang="ko-KR" altLang="en-US" dirty="0" smtClean="0"/>
-              <a:t>최중민 역</a:t>
-            </a:r>
-            <a:r>
-              <a:rPr lang="en-US" altLang="ko-KR" dirty="0" smtClean="0"/>
-              <a:t>, 2000</a:t>
-            </a:r>
-          </a:p>
-          <a:p>
-            <a:pPr marL="0" indent="0">
+              <a:t> </a:t>
+            </a:r>
+            <a:r>
+              <a:rPr lang="en-US" altLang="ko-KR" dirty="0" smtClean="0"/>
+              <a:t>37</a:t>
+            </a:r>
+            <a:endParaRPr lang="en-US" altLang="ko-KR" dirty="0" smtClean="0"/>
+          </a:p>
+          <a:p>
+            <a:pPr lvl="1" eaLnBrk="1" fontAlgn="auto" hangingPunct="1">
+              <a:spcBef>
+                <a:spcPts val="0"/>
+              </a:spcBef>
+              <a:spcAft>
+                <a:spcPts val="0"/>
+              </a:spcAft>
+              <a:buClrTx/>
+              <a:buFont typeface="Arial" charset="0"/>
+              <a:buChar char="•"/>
+            </a:pPr>
+            <a:r>
+              <a:rPr lang="ko-KR" altLang="en-US" dirty="0" smtClean="0"/>
+              <a:t>간선 수 </a:t>
+            </a:r>
+            <a:r>
+              <a:rPr lang="en-US" altLang="ko-KR" dirty="0" smtClean="0"/>
+              <a:t>:</a:t>
+            </a:r>
+            <a:r>
+              <a:rPr lang="ko-KR" altLang="en-US" dirty="0" smtClean="0"/>
+              <a:t> </a:t>
+            </a:r>
+            <a:r>
+              <a:rPr lang="en-US" altLang="ko-KR" dirty="0" smtClean="0"/>
+              <a:t>46</a:t>
+            </a:r>
+            <a:endParaRPr lang="en-US" altLang="ko-KR" dirty="0" smtClean="0"/>
+          </a:p>
+          <a:p>
+            <a:pPr marL="0" marR="0" lvl="0" indent="0" defTabSz="914400" eaLnBrk="1" fontAlgn="auto" latinLnBrk="0" hangingPunct="1">
+              <a:lnSpc>
+                <a:spcPct val="100000"/>
+              </a:lnSpc>
+              <a:spcBef>
+                <a:spcPts val="0"/>
+              </a:spcBef>
+              <a:spcAft>
+                <a:spcPts val="0"/>
+              </a:spcAft>
+              <a:buClrTx/>
+              <a:buSzTx/>
+              <a:buFontTx/>
               <a:buNone/>
+              <a:tabLst/>
+              <a:defRPr/>
             </a:pPr>
             <a:endParaRPr lang="ko-KR" altLang="en-US" dirty="0"/>
           </a:p>
         </p:txBody>
       </p:sp>
+      <p:pic>
+        <p:nvPicPr>
+          <p:cNvPr id="5" name="그림 4"/>
+          <p:cNvPicPr>
+            <a:picLocks noChangeAspect="1"/>
+          </p:cNvPicPr>
+          <p:nvPr/>
+        </p:nvPicPr>
+        <p:blipFill>
+          <a:blip r:embed="rId2">
+            <a:extLst>
+              <a:ext uri="{28A0092B-C50C-407E-A947-70E740481C1C}">
+                <a14:useLocalDpi xmlns:a14="http://schemas.microsoft.com/office/drawing/2010/main" val="0"/>
+              </a:ext>
+            </a:extLst>
+          </a:blip>
+          <a:stretch>
+            <a:fillRect/>
+          </a:stretch>
+        </p:blipFill>
+        <p:spPr>
+          <a:xfrm>
+            <a:off x="4964727" y="2404127"/>
+            <a:ext cx="3483555" cy="3497545"/>
+          </a:xfrm>
+          <a:prstGeom prst="rect">
+            <a:avLst/>
+          </a:prstGeom>
+        </p:spPr>
+      </p:pic>
     </p:spTree>
     <p:extLst>
       <p:ext uri="{BB962C8B-B14F-4D97-AF65-F5344CB8AC3E}">
-        <p14:creationId xmlns:p14="http://schemas.microsoft.com/office/powerpoint/2010/main" val="3210892396"/>
+        <p14:creationId xmlns:p14="http://schemas.microsoft.com/office/powerpoint/2010/main" val="565228155"/>
       </p:ext>
     </p:extLst>
   </p:cSld>
@@ -9041,6 +7212,945 @@
     <p:extLst>
       <p:ext uri="{BB962C8B-B14F-4D97-AF65-F5344CB8AC3E}">
         <p14:creationId xmlns:p14="http://schemas.microsoft.com/office/powerpoint/2010/main" val="2351475174"/>
+      </p:ext>
+    </p:extLst>
+  </p:cSld>
+  <p:clrMapOvr>
+    <a:masterClrMapping/>
+  </p:clrMapOvr>
+</p:sld>
+</file>
+
+<file path=ppt/slides/slide20.xml><?xml version="1.0" encoding="utf-8"?>
+<p:sld xmlns:a="http://schemas.openxmlformats.org/drawingml/2006/main" xmlns:r="http://schemas.openxmlformats.org/officeDocument/2006/relationships" xmlns:p="http://schemas.openxmlformats.org/presentationml/2006/main">
+  <p:cSld>
+    <p:spTree>
+      <p:nvGrpSpPr>
+        <p:cNvPr id="1" name=""/>
+        <p:cNvGrpSpPr/>
+        <p:nvPr/>
+      </p:nvGrpSpPr>
+      <p:grpSpPr>
+        <a:xfrm>
+          <a:off x="0" y="0"/>
+          <a:ext cx="0" cy="0"/>
+          <a:chOff x="0" y="0"/>
+          <a:chExt cx="0" cy="0"/>
+        </a:xfrm>
+      </p:grpSpPr>
+      <p:sp>
+        <p:nvSpPr>
+          <p:cNvPr id="2" name="제목 1"/>
+          <p:cNvSpPr>
+            <a:spLocks noGrp="1"/>
+          </p:cNvSpPr>
+          <p:nvPr>
+            <p:ph type="title"/>
+          </p:nvPr>
+        </p:nvSpPr>
+        <p:spPr/>
+        <p:txBody>
+          <a:bodyPr/>
+          <a:lstStyle/>
+          <a:p>
+            <a:r>
+              <a:rPr lang="en-US" altLang="ko-KR" dirty="0" smtClean="0"/>
+              <a:t>3. </a:t>
+            </a:r>
+            <a:r>
+              <a:rPr lang="ko-KR" altLang="en-US" dirty="0" smtClean="0"/>
+              <a:t>학습</a:t>
+            </a:r>
+            <a:endParaRPr lang="ko-KR" altLang="en-US" dirty="0"/>
+          </a:p>
+        </p:txBody>
+      </p:sp>
+      <p:sp>
+        <p:nvSpPr>
+          <p:cNvPr id="3" name="내용 개체 틀 2"/>
+          <p:cNvSpPr>
+            <a:spLocks noGrp="1"/>
+          </p:cNvSpPr>
+          <p:nvPr>
+            <p:ph idx="1"/>
+          </p:nvPr>
+        </p:nvSpPr>
+        <p:spPr/>
+        <p:txBody>
+          <a:bodyPr/>
+          <a:lstStyle/>
+          <a:p>
+            <a:pPr eaLnBrk="1" fontAlgn="auto" hangingPunct="1">
+              <a:spcBef>
+                <a:spcPts val="0"/>
+              </a:spcBef>
+              <a:spcAft>
+                <a:spcPts val="0"/>
+              </a:spcAft>
+              <a:buClrTx/>
+            </a:pPr>
+            <a:r>
+              <a:rPr lang="ko-KR" altLang="en-US" sz="2000" dirty="0" smtClean="0"/>
+              <a:t>결과</a:t>
+            </a:r>
+            <a:endParaRPr lang="en-US" altLang="ko-KR" sz="2000" dirty="0" smtClean="0"/>
+          </a:p>
+          <a:p>
+            <a:pPr lvl="1" eaLnBrk="1" fontAlgn="auto" hangingPunct="1">
+              <a:spcBef>
+                <a:spcPts val="0"/>
+              </a:spcBef>
+              <a:spcAft>
+                <a:spcPts val="0"/>
+              </a:spcAft>
+              <a:buClrTx/>
+            </a:pPr>
+            <a:r>
+              <a:rPr lang="en-US" altLang="ko-KR" dirty="0" smtClean="0"/>
+              <a:t>Classified target </a:t>
+            </a:r>
+            <a:r>
+              <a:rPr lang="ko-KR" altLang="en-US" dirty="0" smtClean="0"/>
+              <a:t>변경</a:t>
+            </a:r>
+            <a:r>
+              <a:rPr lang="en-US" altLang="ko-KR" dirty="0" smtClean="0"/>
+              <a:t>,</a:t>
+            </a:r>
+            <a:r>
+              <a:rPr lang="ko-KR" altLang="en-US" dirty="0" smtClean="0"/>
+              <a:t> </a:t>
+            </a:r>
+            <a:r>
+              <a:rPr lang="en-US" altLang="ko-KR" dirty="0" smtClean="0"/>
+              <a:t>Random Order</a:t>
+            </a:r>
+            <a:r>
+              <a:rPr lang="ko-KR" altLang="en-US" dirty="0" smtClean="0"/>
+              <a:t> 등 여러 방법을 사용</a:t>
+            </a:r>
+            <a:endParaRPr lang="en-US" altLang="ko-KR" dirty="0"/>
+          </a:p>
+          <a:p>
+            <a:pPr lvl="1" eaLnBrk="1" fontAlgn="auto" hangingPunct="1">
+              <a:spcBef>
+                <a:spcPts val="0"/>
+              </a:spcBef>
+              <a:spcAft>
+                <a:spcPts val="0"/>
+              </a:spcAft>
+              <a:buClrTx/>
+            </a:pPr>
+            <a:r>
+              <a:rPr lang="ko-KR" altLang="en-US" dirty="0" smtClean="0"/>
+              <a:t>그러나 앞의 두 문제와 달리 원하는 네트워크를 얻을 수 없었음</a:t>
+            </a:r>
+            <a:endParaRPr lang="en-US" altLang="ko-KR" dirty="0" smtClean="0"/>
+          </a:p>
+          <a:p>
+            <a:pPr lvl="1" eaLnBrk="1" fontAlgn="auto" hangingPunct="1">
+              <a:spcBef>
+                <a:spcPts val="0"/>
+              </a:spcBef>
+              <a:spcAft>
+                <a:spcPts val="0"/>
+              </a:spcAft>
+              <a:buClrTx/>
+            </a:pPr>
+            <a:endParaRPr lang="en-US" altLang="ko-KR" dirty="0"/>
+          </a:p>
+          <a:p>
+            <a:pPr eaLnBrk="1" fontAlgn="auto" hangingPunct="1">
+              <a:spcBef>
+                <a:spcPts val="0"/>
+              </a:spcBef>
+              <a:spcAft>
+                <a:spcPts val="0"/>
+              </a:spcAft>
+              <a:buClrTx/>
+            </a:pPr>
+            <a:r>
+              <a:rPr lang="ko-KR" altLang="en-US" sz="2000" dirty="0" smtClean="0"/>
+              <a:t>원인 분석</a:t>
+            </a:r>
+            <a:endParaRPr lang="en-US" altLang="ko-KR" sz="2000" dirty="0" smtClean="0"/>
+          </a:p>
+          <a:p>
+            <a:pPr lvl="1" eaLnBrk="1" fontAlgn="auto" hangingPunct="1">
+              <a:spcBef>
+                <a:spcPts val="0"/>
+              </a:spcBef>
+              <a:spcAft>
+                <a:spcPts val="0"/>
+              </a:spcAft>
+              <a:buClrTx/>
+            </a:pPr>
+            <a:r>
+              <a:rPr lang="en-US" altLang="ko-KR" sz="1600" dirty="0" smtClean="0"/>
+              <a:t>K2 Algorithm</a:t>
+            </a:r>
+            <a:r>
+              <a:rPr lang="ko-KR" altLang="en-US" sz="1600" dirty="0" smtClean="0"/>
+              <a:t> 실행시 </a:t>
+            </a:r>
+            <a:r>
+              <a:rPr lang="en-US" altLang="ko-KR" sz="1600" dirty="0" smtClean="0"/>
+              <a:t>node order</a:t>
+            </a:r>
+            <a:r>
+              <a:rPr lang="ko-KR" altLang="en-US" sz="1600" dirty="0" smtClean="0"/>
+              <a:t>가 중요한데 주로 </a:t>
+            </a:r>
+            <a:r>
+              <a:rPr lang="en-US" altLang="ko-KR" sz="1600" dirty="0" smtClean="0"/>
+              <a:t>Topological sort</a:t>
+            </a:r>
+            <a:r>
+              <a:rPr lang="ko-KR" altLang="en-US" sz="1600" dirty="0" smtClean="0"/>
+              <a:t>된 노드 리스트로 수행</a:t>
+            </a:r>
+            <a:endParaRPr lang="en-US" altLang="ko-KR" sz="1600" dirty="0" smtClean="0"/>
+          </a:p>
+          <a:p>
+            <a:pPr lvl="1" eaLnBrk="1" fontAlgn="auto" hangingPunct="1">
+              <a:spcBef>
+                <a:spcPts val="0"/>
+              </a:spcBef>
+              <a:spcAft>
+                <a:spcPts val="0"/>
+              </a:spcAft>
+              <a:buClrTx/>
+            </a:pPr>
+            <a:endParaRPr lang="en-US" altLang="ko-KR" sz="1600" dirty="0" smtClean="0"/>
+          </a:p>
+          <a:p>
+            <a:pPr lvl="1" eaLnBrk="1" fontAlgn="auto" hangingPunct="1">
+              <a:spcBef>
+                <a:spcPts val="0"/>
+              </a:spcBef>
+              <a:spcAft>
+                <a:spcPts val="0"/>
+              </a:spcAft>
+              <a:buClrTx/>
+            </a:pPr>
+            <a:endParaRPr lang="en-US" altLang="ko-KR" sz="1600" dirty="0"/>
+          </a:p>
+          <a:p>
+            <a:pPr eaLnBrk="1" fontAlgn="auto" hangingPunct="1">
+              <a:spcBef>
+                <a:spcPts val="0"/>
+              </a:spcBef>
+              <a:spcAft>
+                <a:spcPts val="0"/>
+              </a:spcAft>
+              <a:buClrTx/>
+            </a:pPr>
+            <a:endParaRPr lang="en-US" altLang="ko-KR" sz="2000" dirty="0"/>
+          </a:p>
+          <a:p>
+            <a:pPr lvl="1" eaLnBrk="1" fontAlgn="auto" hangingPunct="1">
+              <a:spcBef>
+                <a:spcPts val="0"/>
+              </a:spcBef>
+              <a:spcAft>
+                <a:spcPts val="0"/>
+              </a:spcAft>
+              <a:buClrTx/>
+            </a:pPr>
+            <a:endParaRPr lang="en-US" altLang="ko-KR" dirty="0" smtClean="0"/>
+          </a:p>
+          <a:p>
+            <a:pPr eaLnBrk="1" fontAlgn="auto" hangingPunct="1">
+              <a:spcBef>
+                <a:spcPts val="0"/>
+              </a:spcBef>
+              <a:spcAft>
+                <a:spcPts val="0"/>
+              </a:spcAft>
+              <a:buClrTx/>
+            </a:pPr>
+            <a:endParaRPr lang="ko-KR" altLang="en-US" sz="2000" dirty="0"/>
+          </a:p>
+        </p:txBody>
+      </p:sp>
+    </p:spTree>
+    <p:extLst>
+      <p:ext uri="{BB962C8B-B14F-4D97-AF65-F5344CB8AC3E}">
+        <p14:creationId xmlns:p14="http://schemas.microsoft.com/office/powerpoint/2010/main" val="1092894635"/>
+      </p:ext>
+    </p:extLst>
+  </p:cSld>
+  <p:clrMapOvr>
+    <a:masterClrMapping/>
+  </p:clrMapOvr>
+</p:sld>
+</file>
+
+<file path=ppt/slides/slide21.xml><?xml version="1.0" encoding="utf-8"?>
+<p:sld xmlns:a="http://schemas.openxmlformats.org/drawingml/2006/main" xmlns:r="http://schemas.openxmlformats.org/officeDocument/2006/relationships" xmlns:p="http://schemas.openxmlformats.org/presentationml/2006/main">
+  <p:cSld>
+    <p:spTree>
+      <p:nvGrpSpPr>
+        <p:cNvPr id="1" name=""/>
+        <p:cNvGrpSpPr/>
+        <p:nvPr/>
+      </p:nvGrpSpPr>
+      <p:grpSpPr>
+        <a:xfrm>
+          <a:off x="0" y="0"/>
+          <a:ext cx="0" cy="0"/>
+          <a:chOff x="0" y="0"/>
+          <a:chExt cx="0" cy="0"/>
+        </a:xfrm>
+      </p:grpSpPr>
+      <p:sp>
+        <p:nvSpPr>
+          <p:cNvPr id="2" name="제목 1"/>
+          <p:cNvSpPr>
+            <a:spLocks noGrp="1"/>
+          </p:cNvSpPr>
+          <p:nvPr>
+            <p:ph type="title"/>
+          </p:nvPr>
+        </p:nvSpPr>
+        <p:spPr/>
+        <p:txBody>
+          <a:bodyPr/>
+          <a:lstStyle/>
+          <a:p>
+            <a:r>
+              <a:rPr lang="en-US" altLang="ko-KR" dirty="0" smtClean="0"/>
+              <a:t>3. </a:t>
+            </a:r>
+            <a:r>
+              <a:rPr lang="ko-KR" altLang="en-US" dirty="0" smtClean="0"/>
+              <a:t>학습</a:t>
+            </a:r>
+            <a:endParaRPr lang="ko-KR" altLang="en-US" dirty="0"/>
+          </a:p>
+        </p:txBody>
+      </p:sp>
+      <p:sp>
+        <p:nvSpPr>
+          <p:cNvPr id="3" name="내용 개체 틀 2"/>
+          <p:cNvSpPr>
+            <a:spLocks noGrp="1"/>
+          </p:cNvSpPr>
+          <p:nvPr>
+            <p:ph idx="1"/>
+          </p:nvPr>
+        </p:nvSpPr>
+        <p:spPr/>
+        <p:txBody>
+          <a:bodyPr/>
+          <a:lstStyle/>
+          <a:p>
+            <a:pPr eaLnBrk="1" fontAlgn="auto" hangingPunct="1">
+              <a:spcBef>
+                <a:spcPts val="0"/>
+              </a:spcBef>
+              <a:spcAft>
+                <a:spcPts val="0"/>
+              </a:spcAft>
+              <a:buClrTx/>
+            </a:pPr>
+            <a:r>
+              <a:rPr lang="ko-KR" altLang="en-US" sz="2000" dirty="0" smtClean="0"/>
+              <a:t>원인 분석</a:t>
+            </a:r>
+            <a:endParaRPr lang="en-US" altLang="ko-KR" sz="2000" dirty="0" smtClean="0"/>
+          </a:p>
+          <a:p>
+            <a:pPr lvl="1" eaLnBrk="1" fontAlgn="auto" hangingPunct="1">
+              <a:spcBef>
+                <a:spcPts val="0"/>
+              </a:spcBef>
+              <a:spcAft>
+                <a:spcPts val="0"/>
+              </a:spcAft>
+              <a:buClrTx/>
+            </a:pPr>
+            <a:r>
+              <a:rPr lang="en-US" altLang="ko-KR" sz="1600" dirty="0" smtClean="0"/>
+              <a:t>K2 Algorithm</a:t>
+            </a:r>
+            <a:r>
+              <a:rPr lang="ko-KR" altLang="en-US" sz="1600" dirty="0" smtClean="0"/>
+              <a:t> 실행시 </a:t>
+            </a:r>
+            <a:r>
+              <a:rPr lang="en-US" altLang="ko-KR" sz="1600" dirty="0" smtClean="0"/>
+              <a:t>node order</a:t>
+            </a:r>
+            <a:r>
+              <a:rPr lang="ko-KR" altLang="en-US" sz="1600" dirty="0" smtClean="0"/>
+              <a:t>가 중요한데 주로 </a:t>
+            </a:r>
+            <a:r>
+              <a:rPr lang="en-US" altLang="ko-KR" sz="1600" dirty="0" smtClean="0"/>
+              <a:t>Topological sort</a:t>
+            </a:r>
+            <a:r>
+              <a:rPr lang="ko-KR" altLang="en-US" sz="1600" dirty="0" smtClean="0"/>
+              <a:t>된 노드 리스트로 수행</a:t>
+            </a:r>
+            <a:endParaRPr lang="en-US" altLang="ko-KR" sz="1600" dirty="0" smtClean="0"/>
+          </a:p>
+          <a:p>
+            <a:pPr lvl="1" eaLnBrk="1" fontAlgn="auto" hangingPunct="1">
+              <a:spcBef>
+                <a:spcPts val="0"/>
+              </a:spcBef>
+              <a:spcAft>
+                <a:spcPts val="0"/>
+              </a:spcAft>
+              <a:buClrTx/>
+            </a:pPr>
+            <a:endParaRPr lang="en-US" altLang="ko-KR" sz="1600" dirty="0" smtClean="0"/>
+          </a:p>
+          <a:p>
+            <a:pPr lvl="1" eaLnBrk="1" fontAlgn="auto" hangingPunct="1">
+              <a:spcBef>
+                <a:spcPts val="0"/>
+              </a:spcBef>
+              <a:spcAft>
+                <a:spcPts val="0"/>
+              </a:spcAft>
+              <a:buClrTx/>
+            </a:pPr>
+            <a:r>
+              <a:rPr lang="en-US" altLang="ko-KR" sz="1600" dirty="0" smtClean="0"/>
+              <a:t>Topological Order </a:t>
+            </a:r>
+            <a:r>
+              <a:rPr lang="en-US" altLang="ko-KR" sz="1600" dirty="0"/>
+              <a:t>= {</a:t>
+            </a:r>
+            <a:r>
+              <a:rPr lang="en-US" altLang="ko-KR" sz="1600" dirty="0" smtClean="0"/>
+              <a:t>Hypovolemia,LVFailure,History,LVEDVolume,StrokeVolume,CVP,PCWP,CO,InsuffAnesth,Catechol,PAP,PulmEmbolus,Shunt,HR,ErrLowOutput,Anaphylaxis,TPR,ErrCauter,BP,HRBP,HREKG,HRSat,SaO2,PVSat,FiO2,ArtCO2,Intubation,VentAlv,MinVol,VentLung,ExpCO2,KinkedTube,Press,VentTube,VentMach,Disconnect,</a:t>
+            </a:r>
+            <a:r>
+              <a:rPr lang="en-US" altLang="ko-KR" sz="1600" b="1" dirty="0" smtClean="0"/>
+              <a:t>MinVolSet</a:t>
+            </a:r>
+            <a:r>
+              <a:rPr lang="en-US" altLang="ko-KR" sz="1600" dirty="0" smtClean="0"/>
+              <a:t>}</a:t>
+            </a:r>
+          </a:p>
+          <a:p>
+            <a:pPr lvl="1" eaLnBrk="1" fontAlgn="auto" hangingPunct="1">
+              <a:spcBef>
+                <a:spcPts val="0"/>
+              </a:spcBef>
+              <a:spcAft>
+                <a:spcPts val="0"/>
+              </a:spcAft>
+              <a:buClrTx/>
+            </a:pPr>
+            <a:endParaRPr lang="en-US" altLang="ko-KR" sz="1600" dirty="0" smtClean="0"/>
+          </a:p>
+          <a:p>
+            <a:pPr lvl="1" eaLnBrk="1" fontAlgn="auto" hangingPunct="1">
+              <a:spcBef>
+                <a:spcPts val="0"/>
+              </a:spcBef>
+              <a:spcAft>
+                <a:spcPts val="0"/>
+              </a:spcAft>
+              <a:buClrTx/>
+            </a:pPr>
+            <a:r>
+              <a:rPr lang="ko-KR" altLang="en-US" sz="1600" dirty="0" smtClean="0"/>
+              <a:t>이 중 </a:t>
+            </a:r>
+            <a:r>
+              <a:rPr lang="en-US" altLang="ko-KR" sz="1600" dirty="0" err="1" smtClean="0"/>
+              <a:t>MinVolSet</a:t>
+            </a:r>
+            <a:r>
+              <a:rPr lang="ko-KR" altLang="en-US" sz="1600" dirty="0" smtClean="0"/>
+              <a:t>은 </a:t>
+            </a:r>
+            <a:r>
+              <a:rPr lang="en-US" altLang="ko-KR" sz="1600" dirty="0" smtClean="0"/>
+              <a:t>Root Node</a:t>
+            </a:r>
+            <a:r>
+              <a:rPr lang="ko-KR" altLang="en-US" sz="1600" dirty="0" smtClean="0"/>
+              <a:t>에 해당하지만 정렬 결과에 따라 가장 마지막에 위치할 수도 있음</a:t>
+            </a:r>
+            <a:r>
+              <a:rPr lang="en-US" altLang="ko-KR" sz="1600" dirty="0" smtClean="0"/>
+              <a:t>.</a:t>
+            </a:r>
+          </a:p>
+          <a:p>
+            <a:pPr lvl="1" eaLnBrk="1" fontAlgn="auto" hangingPunct="1">
+              <a:spcBef>
+                <a:spcPts val="0"/>
+              </a:spcBef>
+              <a:spcAft>
+                <a:spcPts val="0"/>
+              </a:spcAft>
+              <a:buClrTx/>
+            </a:pPr>
+            <a:r>
+              <a:rPr lang="ko-KR" altLang="en-US" sz="1600" dirty="0" smtClean="0"/>
+              <a:t>하지만 알고리즘 실행시 이 노드를 우선 순위가 낮은 노드로 인식하여 원하는 결과를 얻을 수 없음</a:t>
+            </a:r>
+            <a:r>
+              <a:rPr lang="en-US" altLang="ko-KR" sz="1600" dirty="0" smtClean="0"/>
+              <a:t>.</a:t>
+            </a:r>
+            <a:endParaRPr lang="en-US" altLang="ko-KR" sz="1600" dirty="0"/>
+          </a:p>
+          <a:p>
+            <a:pPr eaLnBrk="1" fontAlgn="auto" hangingPunct="1">
+              <a:spcBef>
+                <a:spcPts val="0"/>
+              </a:spcBef>
+              <a:spcAft>
+                <a:spcPts val="0"/>
+              </a:spcAft>
+              <a:buClrTx/>
+            </a:pPr>
+            <a:endParaRPr lang="en-US" altLang="ko-KR" sz="2000" dirty="0"/>
+          </a:p>
+          <a:p>
+            <a:pPr lvl="1" eaLnBrk="1" fontAlgn="auto" hangingPunct="1">
+              <a:spcBef>
+                <a:spcPts val="0"/>
+              </a:spcBef>
+              <a:spcAft>
+                <a:spcPts val="0"/>
+              </a:spcAft>
+              <a:buClrTx/>
+            </a:pPr>
+            <a:endParaRPr lang="en-US" altLang="ko-KR" dirty="0" smtClean="0"/>
+          </a:p>
+          <a:p>
+            <a:pPr eaLnBrk="1" fontAlgn="auto" hangingPunct="1">
+              <a:spcBef>
+                <a:spcPts val="0"/>
+              </a:spcBef>
+              <a:spcAft>
+                <a:spcPts val="0"/>
+              </a:spcAft>
+              <a:buClrTx/>
+            </a:pPr>
+            <a:endParaRPr lang="ko-KR" altLang="en-US" sz="2000" dirty="0"/>
+          </a:p>
+        </p:txBody>
+      </p:sp>
+    </p:spTree>
+    <p:extLst>
+      <p:ext uri="{BB962C8B-B14F-4D97-AF65-F5344CB8AC3E}">
+        <p14:creationId xmlns:p14="http://schemas.microsoft.com/office/powerpoint/2010/main" val="2125278613"/>
+      </p:ext>
+    </p:extLst>
+  </p:cSld>
+  <p:clrMapOvr>
+    <a:masterClrMapping/>
+  </p:clrMapOvr>
+</p:sld>
+</file>
+
+<file path=ppt/slides/slide22.xml><?xml version="1.0" encoding="utf-8"?>
+<p:sld xmlns:a="http://schemas.openxmlformats.org/drawingml/2006/main" xmlns:r="http://schemas.openxmlformats.org/officeDocument/2006/relationships" xmlns:p="http://schemas.openxmlformats.org/presentationml/2006/main">
+  <p:cSld>
+    <p:spTree>
+      <p:nvGrpSpPr>
+        <p:cNvPr id="1" name=""/>
+        <p:cNvGrpSpPr/>
+        <p:nvPr/>
+      </p:nvGrpSpPr>
+      <p:grpSpPr>
+        <a:xfrm>
+          <a:off x="0" y="0"/>
+          <a:ext cx="0" cy="0"/>
+          <a:chOff x="0" y="0"/>
+          <a:chExt cx="0" cy="0"/>
+        </a:xfrm>
+      </p:grpSpPr>
+      <p:sp>
+        <p:nvSpPr>
+          <p:cNvPr id="2" name="제목 1"/>
+          <p:cNvSpPr>
+            <a:spLocks noGrp="1"/>
+          </p:cNvSpPr>
+          <p:nvPr>
+            <p:ph type="title"/>
+          </p:nvPr>
+        </p:nvSpPr>
+        <p:spPr/>
+        <p:txBody>
+          <a:bodyPr/>
+          <a:lstStyle/>
+          <a:p>
+            <a:r>
+              <a:rPr lang="en-US" altLang="ko-KR" dirty="0" smtClean="0"/>
+              <a:t>3. </a:t>
+            </a:r>
+            <a:r>
+              <a:rPr lang="ko-KR" altLang="en-US" dirty="0" smtClean="0"/>
+              <a:t>학습</a:t>
+            </a:r>
+            <a:endParaRPr lang="ko-KR" altLang="en-US" dirty="0"/>
+          </a:p>
+        </p:txBody>
+      </p:sp>
+      <p:sp>
+        <p:nvSpPr>
+          <p:cNvPr id="3" name="내용 개체 틀 2"/>
+          <p:cNvSpPr>
+            <a:spLocks noGrp="1"/>
+          </p:cNvSpPr>
+          <p:nvPr>
+            <p:ph idx="1"/>
+          </p:nvPr>
+        </p:nvSpPr>
+        <p:spPr/>
+        <p:txBody>
+          <a:bodyPr/>
+          <a:lstStyle/>
+          <a:p>
+            <a:pPr eaLnBrk="1" fontAlgn="auto" hangingPunct="1">
+              <a:spcBef>
+                <a:spcPts val="0"/>
+              </a:spcBef>
+              <a:spcAft>
+                <a:spcPts val="0"/>
+              </a:spcAft>
+              <a:buClrTx/>
+            </a:pPr>
+            <a:r>
+              <a:rPr lang="ko-KR" altLang="en-US" sz="2000" dirty="0" smtClean="0"/>
+              <a:t>해결 방안</a:t>
+            </a:r>
+            <a:endParaRPr lang="en-US" altLang="ko-KR" sz="2000" dirty="0" smtClean="0"/>
+          </a:p>
+          <a:p>
+            <a:pPr lvl="1" eaLnBrk="1" fontAlgn="auto" hangingPunct="1">
+              <a:spcBef>
+                <a:spcPts val="0"/>
+              </a:spcBef>
+              <a:spcAft>
+                <a:spcPts val="0"/>
+              </a:spcAft>
+              <a:buClrTx/>
+            </a:pPr>
+            <a:r>
+              <a:rPr lang="ko-KR" altLang="en-US" sz="1600" dirty="0" smtClean="0"/>
+              <a:t>명백히 </a:t>
+            </a:r>
+            <a:r>
+              <a:rPr lang="en-US" altLang="ko-KR" sz="1600" dirty="0" err="1" smtClean="0"/>
+              <a:t>Indegree</a:t>
+            </a:r>
+            <a:r>
+              <a:rPr lang="ko-KR" altLang="en-US" sz="1600" dirty="0" smtClean="0"/>
+              <a:t>가 </a:t>
+            </a:r>
+            <a:r>
+              <a:rPr lang="en-US" altLang="ko-KR" sz="1600" dirty="0" smtClean="0"/>
+              <a:t>0</a:t>
+            </a:r>
+            <a:r>
+              <a:rPr lang="ko-KR" altLang="en-US" sz="1600" dirty="0" smtClean="0"/>
+              <a:t>인 노드와 이 노드들에 대해서만 종속적인 노드를 제외하고</a:t>
+            </a:r>
+            <a:r>
+              <a:rPr lang="en-US" altLang="ko-KR" sz="1600" dirty="0" smtClean="0"/>
+              <a:t>,</a:t>
+            </a:r>
+            <a:r>
+              <a:rPr lang="ko-KR" altLang="en-US" sz="1600" dirty="0" smtClean="0"/>
+              <a:t> 각 실행 때마다 하나의 </a:t>
+            </a:r>
+            <a:r>
+              <a:rPr lang="en-US" altLang="ko-KR" sz="1600" dirty="0" smtClean="0"/>
+              <a:t>Root node</a:t>
+            </a:r>
+            <a:r>
+              <a:rPr lang="ko-KR" altLang="en-US" sz="1600" dirty="0" smtClean="0"/>
+              <a:t>만 포함</a:t>
+            </a:r>
+            <a:r>
+              <a:rPr lang="en-US" altLang="ko-KR" sz="1600" dirty="0" smtClean="0"/>
+              <a:t>.</a:t>
+            </a:r>
+          </a:p>
+          <a:p>
+            <a:pPr lvl="1" eaLnBrk="1" fontAlgn="auto" hangingPunct="1">
+              <a:spcBef>
+                <a:spcPts val="0"/>
+              </a:spcBef>
+              <a:spcAft>
+                <a:spcPts val="0"/>
+              </a:spcAft>
+              <a:buClrTx/>
+            </a:pPr>
+            <a:endParaRPr lang="en-US" altLang="ko-KR" sz="1600" dirty="0" smtClean="0"/>
+          </a:p>
+          <a:p>
+            <a:pPr lvl="1" eaLnBrk="1" fontAlgn="auto" hangingPunct="1">
+              <a:spcBef>
+                <a:spcPts val="0"/>
+              </a:spcBef>
+              <a:spcAft>
+                <a:spcPts val="0"/>
+              </a:spcAft>
+              <a:buClrTx/>
+            </a:pPr>
+            <a:r>
+              <a:rPr lang="ko-KR" altLang="en-US" sz="1600" dirty="0" smtClean="0"/>
+              <a:t>각 실행 때마다 공통적인 종속관계를 파악한 후 이를 간선으로 연결</a:t>
+            </a:r>
+            <a:r>
+              <a:rPr lang="en-US" altLang="ko-KR" sz="1600" dirty="0" smtClean="0"/>
+              <a:t>.</a:t>
+            </a:r>
+          </a:p>
+          <a:p>
+            <a:pPr lvl="1" eaLnBrk="1" fontAlgn="auto" hangingPunct="1">
+              <a:spcBef>
+                <a:spcPts val="0"/>
+              </a:spcBef>
+              <a:spcAft>
+                <a:spcPts val="0"/>
+              </a:spcAft>
+              <a:buClrTx/>
+            </a:pPr>
+            <a:endParaRPr lang="en-US" altLang="ko-KR" sz="1600" dirty="0"/>
+          </a:p>
+          <a:p>
+            <a:pPr lvl="1" eaLnBrk="1" fontAlgn="auto" hangingPunct="1">
+              <a:spcBef>
+                <a:spcPts val="0"/>
+              </a:spcBef>
+              <a:spcAft>
+                <a:spcPts val="0"/>
+              </a:spcAft>
+              <a:buClrTx/>
+            </a:pPr>
+            <a:r>
+              <a:rPr lang="ko-KR" altLang="en-US" sz="1600" dirty="0" smtClean="0"/>
+              <a:t>문제점</a:t>
+            </a:r>
+            <a:endParaRPr lang="en-US" altLang="ko-KR" sz="1600" dirty="0" smtClean="0"/>
+          </a:p>
+          <a:p>
+            <a:pPr lvl="2" eaLnBrk="1" fontAlgn="auto" hangingPunct="1">
+              <a:spcBef>
+                <a:spcPts val="0"/>
+              </a:spcBef>
+              <a:spcAft>
+                <a:spcPts val="0"/>
+              </a:spcAft>
+              <a:buClrTx/>
+              <a:buFont typeface="Wingdings" charset="2"/>
+              <a:buChar char="ü"/>
+            </a:pPr>
+            <a:r>
+              <a:rPr lang="ko-KR" altLang="en-US" sz="1400" dirty="0" smtClean="0"/>
+              <a:t>어떻게 명백히 </a:t>
+            </a:r>
+            <a:r>
+              <a:rPr lang="en-US" altLang="ko-KR" sz="1400" dirty="0" err="1" smtClean="0"/>
+              <a:t>Indegree</a:t>
+            </a:r>
+            <a:r>
+              <a:rPr lang="ko-KR" altLang="en-US" sz="1400" dirty="0" smtClean="0"/>
+              <a:t>가 </a:t>
+            </a:r>
+            <a:r>
+              <a:rPr lang="en-US" altLang="ko-KR" sz="1400" dirty="0" smtClean="0"/>
+              <a:t>0</a:t>
+            </a:r>
+            <a:r>
+              <a:rPr lang="ko-KR" altLang="en-US" sz="1400" dirty="0" smtClean="0"/>
+              <a:t>인 노드를 파악할 것인가</a:t>
+            </a:r>
+            <a:r>
+              <a:rPr lang="en-US" altLang="ko-KR" sz="1400" dirty="0" smtClean="0"/>
+              <a:t>?</a:t>
+            </a:r>
+          </a:p>
+          <a:p>
+            <a:pPr lvl="2" eaLnBrk="1" fontAlgn="auto" hangingPunct="1">
+              <a:spcBef>
+                <a:spcPts val="0"/>
+              </a:spcBef>
+              <a:spcAft>
+                <a:spcPts val="0"/>
+              </a:spcAft>
+              <a:buClrTx/>
+              <a:buFont typeface="Wingdings" charset="2"/>
+              <a:buChar char="ü"/>
+            </a:pPr>
+            <a:r>
+              <a:rPr lang="ko-KR" altLang="en-US" sz="1400" dirty="0" smtClean="0"/>
+              <a:t>각 노드 간 기본적인 종속 관계는 쉽게 파악될 수 있나</a:t>
+            </a:r>
+            <a:r>
+              <a:rPr lang="en-US" altLang="ko-KR" sz="1400" dirty="0" smtClean="0"/>
+              <a:t>?</a:t>
+            </a:r>
+          </a:p>
+          <a:p>
+            <a:pPr lvl="1" eaLnBrk="1" fontAlgn="auto" hangingPunct="1">
+              <a:spcBef>
+                <a:spcPts val="0"/>
+              </a:spcBef>
+              <a:spcAft>
+                <a:spcPts val="0"/>
+              </a:spcAft>
+              <a:buClrTx/>
+            </a:pPr>
+            <a:endParaRPr lang="en-US" altLang="ko-KR" sz="1600" dirty="0"/>
+          </a:p>
+          <a:p>
+            <a:pPr lvl="1" eaLnBrk="1" fontAlgn="auto" hangingPunct="1">
+              <a:spcBef>
+                <a:spcPts val="0"/>
+              </a:spcBef>
+              <a:spcAft>
+                <a:spcPts val="0"/>
+              </a:spcAft>
+              <a:buClrTx/>
+            </a:pPr>
+            <a:endParaRPr lang="en-US" altLang="ko-KR" sz="1600" dirty="0" smtClean="0"/>
+          </a:p>
+        </p:txBody>
+      </p:sp>
+    </p:spTree>
+    <p:extLst>
+      <p:ext uri="{BB962C8B-B14F-4D97-AF65-F5344CB8AC3E}">
+        <p14:creationId xmlns:p14="http://schemas.microsoft.com/office/powerpoint/2010/main" val="516063492"/>
+      </p:ext>
+    </p:extLst>
+  </p:cSld>
+  <p:clrMapOvr>
+    <a:masterClrMapping/>
+  </p:clrMapOvr>
+</p:sld>
+</file>
+
+<file path=ppt/slides/slide23.xml><?xml version="1.0" encoding="utf-8"?>
+<p:sld xmlns:a="http://schemas.openxmlformats.org/drawingml/2006/main" xmlns:r="http://schemas.openxmlformats.org/officeDocument/2006/relationships" xmlns:p="http://schemas.openxmlformats.org/presentationml/2006/main">
+  <p:cSld>
+    <p:spTree>
+      <p:nvGrpSpPr>
+        <p:cNvPr id="1" name=""/>
+        <p:cNvGrpSpPr/>
+        <p:nvPr/>
+      </p:nvGrpSpPr>
+      <p:grpSpPr>
+        <a:xfrm>
+          <a:off x="0" y="0"/>
+          <a:ext cx="0" cy="0"/>
+          <a:chOff x="0" y="0"/>
+          <a:chExt cx="0" cy="0"/>
+        </a:xfrm>
+      </p:grpSpPr>
+      <p:sp>
+        <p:nvSpPr>
+          <p:cNvPr id="2" name="제목 1"/>
+          <p:cNvSpPr>
+            <a:spLocks noGrp="1"/>
+          </p:cNvSpPr>
+          <p:nvPr>
+            <p:ph type="title"/>
+          </p:nvPr>
+        </p:nvSpPr>
+        <p:spPr/>
+        <p:txBody>
+          <a:bodyPr/>
+          <a:lstStyle/>
+          <a:p>
+            <a:r>
+              <a:rPr lang="ko-KR" altLang="en-US" dirty="0" smtClean="0"/>
+              <a:t>참고문</a:t>
+            </a:r>
+            <a:r>
+              <a:rPr lang="ko-KR" altLang="en-US" dirty="0"/>
+              <a:t>헌</a:t>
+            </a:r>
+          </a:p>
+        </p:txBody>
+      </p:sp>
+      <p:sp>
+        <p:nvSpPr>
+          <p:cNvPr id="3" name="내용 개체 틀 2"/>
+          <p:cNvSpPr>
+            <a:spLocks noGrp="1"/>
+          </p:cNvSpPr>
+          <p:nvPr>
+            <p:ph idx="1"/>
+          </p:nvPr>
+        </p:nvSpPr>
+        <p:spPr/>
+        <p:txBody>
+          <a:bodyPr/>
+          <a:lstStyle/>
+          <a:p>
+            <a:r>
+              <a:rPr lang="en-US" altLang="ko-KR" dirty="0"/>
+              <a:t>Kevin Murphy, </a:t>
+            </a:r>
+            <a:r>
+              <a:rPr lang="en-US" altLang="ko-KR" dirty="0" smtClean="0"/>
+              <a:t>“A </a:t>
+            </a:r>
+            <a:r>
+              <a:rPr lang="en-US" altLang="ko-KR" dirty="0"/>
+              <a:t>Brief Introduction to Graphical Models and Bayesian </a:t>
+            </a:r>
+            <a:r>
+              <a:rPr lang="en-US" altLang="ko-KR" dirty="0" smtClean="0"/>
+              <a:t>Networks”, 1998</a:t>
+            </a:r>
+          </a:p>
+          <a:p>
+            <a:r>
+              <a:rPr lang="ko-KR" altLang="en-US" dirty="0" smtClean="0"/>
+              <a:t>인공지능</a:t>
+            </a:r>
+            <a:r>
+              <a:rPr lang="en-US" altLang="ko-KR" dirty="0" smtClean="0"/>
+              <a:t>-</a:t>
+            </a:r>
+            <a:r>
+              <a:rPr lang="ko-KR" altLang="en-US" dirty="0" smtClean="0"/>
+              <a:t>지능형 에이전트를 중심으로</a:t>
+            </a:r>
+            <a:r>
+              <a:rPr lang="en-US" altLang="ko-KR" dirty="0" smtClean="0"/>
+              <a:t>, Nils J. Nilsson, </a:t>
+            </a:r>
+            <a:r>
+              <a:rPr lang="ko-KR" altLang="en-US" dirty="0" smtClean="0"/>
+              <a:t>최중민 역</a:t>
+            </a:r>
+            <a:r>
+              <a:rPr lang="en-US" altLang="ko-KR" dirty="0" smtClean="0"/>
+              <a:t>, 2000</a:t>
+            </a:r>
+          </a:p>
+          <a:p>
+            <a:pPr marL="0" indent="0">
+              <a:buNone/>
+            </a:pPr>
+            <a:endParaRPr lang="ko-KR" altLang="en-US" dirty="0"/>
+          </a:p>
+        </p:txBody>
+      </p:sp>
+    </p:spTree>
+    <p:extLst>
+      <p:ext uri="{BB962C8B-B14F-4D97-AF65-F5344CB8AC3E}">
+        <p14:creationId xmlns:p14="http://schemas.microsoft.com/office/powerpoint/2010/main" val="3210892396"/>
       </p:ext>
     </p:extLst>
   </p:cSld>
@@ -9687,8 +8797,8 @@
           </a:p>
         </p:txBody>
       </p:sp>
-      <mc:AlternateContent xmlns:mc="http://schemas.openxmlformats.org/markup-compatibility/2006">
-        <mc:Choice xmlns:a14="http://schemas.microsoft.com/office/drawing/2010/main" Requires="a14">
+      <mc:AlternateContent xmlns:mc="http://schemas.openxmlformats.org/markup-compatibility/2006" xmlns:a14="http://schemas.microsoft.com/office/drawing/2010/main">
+        <mc:Choice Requires="a14">
           <p:sp>
             <p:nvSpPr>
               <p:cNvPr id="3" name="내용 개체 틀 2"/>
@@ -9835,7 +8945,7 @@
                       <m:fPr>
                         <m:ctrlPr>
                           <a:rPr lang="en-US" altLang="ko-KR" sz="3200" i="1">
-                            <a:latin typeface="Cambria Math" pitchFamily="18" charset="0"/>
+                            <a:latin typeface="Cambria Math" charset="0"/>
                             <a:ea typeface="Cambria Math" pitchFamily="18" charset="0"/>
                           </a:rPr>
                         </m:ctrlPr>
@@ -9931,7 +9041,7 @@
             </p:txBody>
           </p:sp>
         </mc:Choice>
-        <mc:Fallback>
+        <mc:Fallback xmlns="">
           <p:sp>
             <p:nvSpPr>
               <p:cNvPr id="3" name="내용 개체 틀 2"/>
@@ -11719,7 +10829,7 @@
   </a:extraClrSchemeLst>
   <a:extLst>
     <a:ext uri="{05A4C25C-085E-4340-85A3-A5531E510DB2}">
-      <thm15:themeFamily xmlns="" xmlns:thm15="http://schemas.microsoft.com/office/thememl/2012/main" name="Office Theme" id="{62F939B6-93AF-4DB8-9C6B-D6C7DFDC589F}" vid="{4A3C46E8-61CC-4603-A589-7422A47A8E4A}"/>
+      <thm15:themeFamily xmlns:thm15="http://schemas.microsoft.com/office/thememl/2012/main" name="Office Theme" id="{62F939B6-93AF-4DB8-9C6B-D6C7DFDC589F}" vid="{4A3C46E8-61CC-4603-A589-7422A47A8E4A}"/>
     </a:ext>
   </a:extLst>
 </a:theme>
@@ -11980,7 +11090,7 @@
   <a:extraClrSchemeLst/>
   <a:extLst>
     <a:ext uri="{05A4C25C-085E-4340-85A3-A5531E510DB2}">
-      <thm15:themeFamily xmlns="" xmlns:thm15="http://schemas.microsoft.com/office/thememl/2012/main" name="Office Theme" id="{62F939B6-93AF-4DB8-9C6B-D6C7DFDC589F}" vid="{4A3C46E8-61CC-4603-A589-7422A47A8E4A}"/>
+      <thm15:themeFamily xmlns:thm15="http://schemas.microsoft.com/office/thememl/2012/main" name="Office Theme" id="{62F939B6-93AF-4DB8-9C6B-D6C7DFDC589F}" vid="{4A3C46E8-61CC-4603-A589-7422A47A8E4A}"/>
     </a:ext>
   </a:extLst>
 </a:theme>

</xml_diff>